<commit_message>
Screenshots in group log
</commit_message>
<xml_diff>
--- a/Important Docs and Links/NFL-Picks Poster.pptx
+++ b/Important Docs and Links/NFL-Picks Poster.pptx
@@ -2623,17 +2623,35 @@
               <a:rPr lang="en-US" sz="3200" b="1" dirty="0" smtClean="0">
                 <a:latin typeface="Calibri" pitchFamily="34" charset="0"/>
               </a:rPr>
-              <a:t>Talk about Bootstrap here</a:t>
+              <a:t>Bootstrap </a:t>
             </a:r>
             <a:r>
               <a:rPr lang="en-US" sz="3200" dirty="0" smtClean="0">
                 <a:latin typeface="Calibri" pitchFamily="34" charset="0"/>
               </a:rPr>
-              <a:t>.</a:t>
-            </a:r>
-            <a:endParaRPr lang="en-US" sz="3200" dirty="0">
+              <a:t>is an open-source front-end web framework</a:t>
+            </a:r>
+          </a:p>
+          <a:p>
+            <a:pPr eaLnBrk="1" hangingPunct="1"/>
+            <a:endParaRPr lang="en-US" sz="3200" b="1" dirty="0">
               <a:latin typeface="Calibri" pitchFamily="34" charset="0"/>
             </a:endParaRPr>
+          </a:p>
+          <a:p>
+            <a:pPr eaLnBrk="1" hangingPunct="1"/>
+            <a:r>
+              <a:rPr lang="en-US" sz="3200" b="1" dirty="0" smtClean="0">
+                <a:latin typeface="Calibri" pitchFamily="34" charset="0"/>
+              </a:rPr>
+              <a:t>Bootstrap </a:t>
+            </a:r>
+            <a:r>
+              <a:rPr lang="en-US" sz="3200" dirty="0" smtClean="0">
+                <a:latin typeface="Calibri" pitchFamily="34" charset="0"/>
+              </a:rPr>
+              <a:t>contains CSS design templates for common HTML elements</a:t>
+            </a:r>
           </a:p>
           <a:p>
             <a:pPr eaLnBrk="1" hangingPunct="1"/>
@@ -2644,22 +2662,10 @@
           <a:p>
             <a:pPr eaLnBrk="1" hangingPunct="1"/>
             <a:r>
-              <a:rPr lang="en-US" sz="3200" dirty="0">
-                <a:latin typeface="Calibri" pitchFamily="34" charset="0"/>
-              </a:rPr>
-              <a:t>This text box will automatically re-size to your text. To turn off that feature, right click inside this box and go to </a:t>
-            </a:r>
-            <a:r>
-              <a:rPr lang="en-US" sz="3200" b="1" dirty="0">
-                <a:latin typeface="Calibri" pitchFamily="34" charset="0"/>
-              </a:rPr>
-              <a:t>Format Shape, Text Box, Autofit</a:t>
-            </a:r>
-            <a:r>
-              <a:rPr lang="en-US" sz="3200" dirty="0">
-                <a:latin typeface="Calibri" pitchFamily="34" charset="0"/>
-              </a:rPr>
-              <a:t>, and select the “Do Not Autofit” radio button.</a:t>
+              <a:rPr lang="en-US" sz="3200" dirty="0" smtClean="0">
+                <a:latin typeface="Calibri" pitchFamily="34" charset="0"/>
+              </a:rPr>
+              <a:t>This made designing our site simple and straightforward and resulted in a clean look that is easy to view and understand</a:t>
             </a:r>
           </a:p>
           <a:p>
@@ -2671,28 +2677,22 @@
           <a:p>
             <a:pPr eaLnBrk="1" hangingPunct="1"/>
             <a:r>
-              <a:rPr lang="en-US" sz="3200" dirty="0">
-                <a:latin typeface="Calibri" pitchFamily="34" charset="0"/>
-              </a:rPr>
-              <a:t>To change the font style of this text box: Click on the border once to highlight the entire text box, then select a different font or font size that suits you. This text is Calibri 32pt and is easily </a:t>
-            </a:r>
-            <a:r>
               <a:rPr lang="en-US" sz="3200" dirty="0" smtClean="0">
                 <a:latin typeface="Calibri" pitchFamily="34" charset="0"/>
               </a:rPr>
-              <a:t>read </a:t>
-            </a:r>
-            <a:r>
-              <a:rPr lang="en-US" sz="3200" dirty="0">
-                <a:latin typeface="Calibri" pitchFamily="34" charset="0"/>
-              </a:rPr>
-              <a:t>up to 5 feet away on a 36x48 poster</a:t>
+              <a:t>Also, since </a:t>
+            </a:r>
+            <a:r>
+              <a:rPr lang="en-US" sz="3200" b="1" dirty="0" smtClean="0">
+                <a:latin typeface="Calibri" pitchFamily="34" charset="0"/>
+              </a:rPr>
+              <a:t>Bootstrap </a:t>
             </a:r>
             <a:r>
               <a:rPr lang="en-US" sz="3200" dirty="0" smtClean="0">
                 <a:latin typeface="Calibri" pitchFamily="34" charset="0"/>
               </a:rPr>
-              <a:t>.</a:t>
+              <a:t>is open-source, there are a variety of plugins that have been made for it</a:t>
             </a:r>
           </a:p>
           <a:p>
@@ -2704,18 +2704,30 @@
           <a:p>
             <a:pPr eaLnBrk="1" hangingPunct="1"/>
             <a:r>
+              <a:rPr lang="en-US" sz="3200" dirty="0" smtClean="0">
+                <a:latin typeface="Calibri" pitchFamily="34" charset="0"/>
+              </a:rPr>
+              <a:t>These plugins allowed us to </a:t>
+            </a:r>
+            <a:r>
               <a:rPr lang="en-US" sz="3200" dirty="0">
                 <a:latin typeface="Calibri" pitchFamily="34" charset="0"/>
               </a:rPr>
-              <a:t>Zoom out to 100% to preview what this will look like on your printed poster</a:t>
+              <a:t>add some functionality that would have taken much more </a:t>
             </a:r>
             <a:r>
               <a:rPr lang="en-US" sz="3200" dirty="0" smtClean="0">
                 <a:latin typeface="Calibri" pitchFamily="34" charset="0"/>
               </a:rPr>
-              <a:t>..</a:t>
-            </a:r>
-            <a:endParaRPr lang="en-US" sz="3200" dirty="0">
+              <a:t>time and effort if we were to write the code for them on </a:t>
+            </a:r>
+            <a:r>
+              <a:rPr lang="en-US" sz="3200" smtClean="0">
+                <a:latin typeface="Calibri" pitchFamily="34" charset="0"/>
+              </a:rPr>
+              <a:t>our own</a:t>
+            </a:r>
+            <a:endParaRPr lang="en-US" sz="3200" dirty="0" smtClean="0">
               <a:latin typeface="Calibri" pitchFamily="34" charset="0"/>
             </a:endParaRPr>
           </a:p>

</xml_diff>

<commit_message>
Continued work on poster
</commit_message>
<xml_diff>
--- a/Important Docs and Links/NFL-Picks Poster.pptx
+++ b/Important Docs and Links/NFL-Picks Poster.pptx
@@ -2719,13 +2719,7 @@
               <a:rPr lang="en-US" sz="3200" dirty="0" smtClean="0">
                 <a:latin typeface="Calibri" pitchFamily="34" charset="0"/>
               </a:rPr>
-              <a:t>time and effort if we were to write the code for them on </a:t>
-            </a:r>
-            <a:r>
-              <a:rPr lang="en-US" sz="3200" smtClean="0">
-                <a:latin typeface="Calibri" pitchFamily="34" charset="0"/>
-              </a:rPr>
-              <a:t>our own</a:t>
+              <a:t>time and effort if we were to write the code for them on our own</a:t>
             </a:r>
             <a:endParaRPr lang="en-US" sz="3200" dirty="0" smtClean="0">
               <a:latin typeface="Calibri" pitchFamily="34" charset="0"/>
@@ -3165,7 +3159,7 @@
         <p:spPr bwMode="auto">
           <a:xfrm>
             <a:off x="28803600" y="5715000"/>
-            <a:ext cx="13167360" cy="7232749"/>
+            <a:ext cx="13167360" cy="8217634"/>
           </a:xfrm>
           <a:prstGeom prst="rect">
             <a:avLst/>
@@ -3290,35 +3284,62 @@
               <a:rPr lang="en-US" sz="3200" b="1" dirty="0" smtClean="0">
                 <a:latin typeface="Calibri" pitchFamily="34" charset="0"/>
               </a:rPr>
-              <a:t>Talk about </a:t>
-            </a:r>
-            <a:r>
-              <a:rPr lang="en-US" sz="3200" b="1" dirty="0" err="1" smtClean="0">
-                <a:latin typeface="Calibri" pitchFamily="34" charset="0"/>
-              </a:rPr>
-              <a:t>Javascript</a:t>
-            </a:r>
-            <a:r>
-              <a:rPr lang="en-US" sz="3200" b="1" dirty="0" smtClean="0">
-                <a:latin typeface="Calibri" pitchFamily="34" charset="0"/>
-              </a:rPr>
-              <a:t> and </a:t>
-            </a:r>
-            <a:r>
-              <a:rPr lang="en-US" sz="3200" b="1" dirty="0" err="1" smtClean="0">
-                <a:latin typeface="Calibri" pitchFamily="34" charset="0"/>
-              </a:rPr>
-              <a:t>Jquery</a:t>
-            </a:r>
-            <a:r>
-              <a:rPr lang="en-US" sz="3200" b="1" dirty="0" smtClean="0">
-                <a:latin typeface="Calibri" pitchFamily="34" charset="0"/>
-              </a:rPr>
-              <a:t> here</a:t>
-            </a:r>
+              <a:t>JavaScript </a:t>
+            </a:r>
+            <a:r>
+              <a:rPr lang="en-US" sz="3200" dirty="0" smtClean="0">
+                <a:latin typeface="Calibri" pitchFamily="34" charset="0"/>
+              </a:rPr>
+              <a:t>is a programming language that serves as one of three core technologies in </a:t>
+            </a:r>
+            <a:r>
+              <a:rPr lang="en-US" sz="3200" dirty="0">
+                <a:latin typeface="Calibri" pitchFamily="34" charset="0"/>
+              </a:rPr>
+              <a:t>w</a:t>
+            </a:r>
+            <a:r>
+              <a:rPr lang="en-US" sz="3200" dirty="0" smtClean="0">
+                <a:latin typeface="Calibri" pitchFamily="34" charset="0"/>
+              </a:rPr>
+              <a:t>eb development, the other two being HTML and CSS</a:t>
+            </a:r>
+          </a:p>
+          <a:p>
+            <a:pPr eaLnBrk="1" hangingPunct="1"/>
             <a:endParaRPr lang="en-US" sz="3200" b="1" dirty="0">
               <a:latin typeface="Calibri" pitchFamily="34" charset="0"/>
             </a:endParaRPr>
+          </a:p>
+          <a:p>
+            <a:pPr eaLnBrk="1" hangingPunct="1"/>
+            <a:r>
+              <a:rPr lang="en-US" sz="3200" b="1" dirty="0" smtClean="0">
+                <a:latin typeface="Calibri" pitchFamily="34" charset="0"/>
+              </a:rPr>
+              <a:t>JavaScript </a:t>
+            </a:r>
+            <a:r>
+              <a:rPr lang="en-US" sz="3200" dirty="0" smtClean="0">
+                <a:latin typeface="Calibri" pitchFamily="34" charset="0"/>
+              </a:rPr>
+              <a:t>allowed us to make our web pages more dynamic and easy to use</a:t>
+            </a:r>
+          </a:p>
+          <a:p>
+            <a:pPr eaLnBrk="1" hangingPunct="1"/>
+            <a:endParaRPr lang="en-US" sz="3200" b="1" dirty="0">
+              <a:latin typeface="Calibri" pitchFamily="34" charset="0"/>
+            </a:endParaRPr>
+          </a:p>
+          <a:p>
+            <a:pPr eaLnBrk="1" hangingPunct="1"/>
+            <a:r>
+              <a:rPr lang="en-US" sz="3200" dirty="0" smtClean="0">
+                <a:latin typeface="Calibri" pitchFamily="34" charset="0"/>
+              </a:rPr>
+              <a:t>It can be used to manipulate the HTML DOM, allowing us to change our web pages on the fly without having to reload the page</a:t>
+            </a:r>
           </a:p>
           <a:p>
             <a:pPr eaLnBrk="1" hangingPunct="1"/>
@@ -3329,22 +3350,34 @@
           <a:p>
             <a:pPr eaLnBrk="1" hangingPunct="1"/>
             <a:r>
-              <a:rPr lang="en-US" sz="3200" dirty="0">
-                <a:latin typeface="Calibri" pitchFamily="34" charset="0"/>
-              </a:rPr>
-              <a:t>This text box will automatically re-size to your text. To turn off that feature, right click inside this box and go to </a:t>
-            </a:r>
-            <a:r>
-              <a:rPr lang="en-US" sz="3200" b="1" dirty="0">
-                <a:latin typeface="Calibri" pitchFamily="34" charset="0"/>
-              </a:rPr>
-              <a:t>Format Shape, Text Box, Autofit</a:t>
-            </a:r>
-            <a:r>
-              <a:rPr lang="en-US" sz="3200" dirty="0">
-                <a:latin typeface="Calibri" pitchFamily="34" charset="0"/>
-              </a:rPr>
-              <a:t>, and select the “Do Not Autofit” radio button.</a:t>
+              <a:rPr lang="en-US" sz="3200" dirty="0" smtClean="0">
+                <a:latin typeface="Calibri" pitchFamily="34" charset="0"/>
+              </a:rPr>
+              <a:t>Moreover, manipulating the HTML DOM became especially easy with the use of </a:t>
+            </a:r>
+            <a:r>
+              <a:rPr lang="en-US" sz="3200" b="1" dirty="0" smtClean="0">
+                <a:latin typeface="Calibri" pitchFamily="34" charset="0"/>
+              </a:rPr>
+              <a:t>jQuery</a:t>
+            </a:r>
+            <a:r>
+              <a:rPr lang="en-US" sz="3200" dirty="0" smtClean="0">
+                <a:latin typeface="Calibri" pitchFamily="34" charset="0"/>
+              </a:rPr>
+              <a:t>, a cross-platform </a:t>
+            </a:r>
+            <a:r>
+              <a:rPr lang="en-US" sz="3200" b="1" dirty="0" smtClean="0">
+                <a:latin typeface="Calibri" pitchFamily="34" charset="0"/>
+              </a:rPr>
+              <a:t>JavaScript </a:t>
+            </a:r>
+            <a:r>
+              <a:rPr lang="en-US" sz="3200" dirty="0" smtClean="0">
+                <a:latin typeface="Calibri" pitchFamily="34" charset="0"/>
+              </a:rPr>
+              <a:t>library</a:t>
             </a:r>
           </a:p>
           <a:p>
@@ -3356,43 +3389,16 @@
           <a:p>
             <a:pPr eaLnBrk="1" hangingPunct="1"/>
             <a:r>
-              <a:rPr lang="en-US" sz="3200" dirty="0">
-                <a:latin typeface="Calibri" pitchFamily="34" charset="0"/>
-              </a:rPr>
-              <a:t>To change the font style of this text box: Click on the border once to highlight the entire text box, then select a different font or font size that suits you. This text is Calibri 32pt and is easily </a:t>
+              <a:rPr lang="en-US" sz="3200" b="1" dirty="0" smtClean="0">
+                <a:latin typeface="Calibri" pitchFamily="34" charset="0"/>
+              </a:rPr>
+              <a:t>jQuery </a:t>
             </a:r>
             <a:r>
               <a:rPr lang="en-US" sz="3200" dirty="0" smtClean="0">
                 <a:latin typeface="Calibri" pitchFamily="34" charset="0"/>
               </a:rPr>
-              <a:t>read </a:t>
-            </a:r>
-            <a:r>
-              <a:rPr lang="en-US" sz="3200" dirty="0">
-                <a:latin typeface="Calibri" pitchFamily="34" charset="0"/>
-              </a:rPr>
-              <a:t>up to 5 feet away on a 36x48 poster</a:t>
-            </a:r>
-            <a:r>
-              <a:rPr lang="en-US" sz="3200" dirty="0" smtClean="0">
-                <a:latin typeface="Calibri" pitchFamily="34" charset="0"/>
-              </a:rPr>
-              <a:t>.</a:t>
-            </a:r>
-          </a:p>
-          <a:p>
-            <a:pPr eaLnBrk="1" hangingPunct="1"/>
-            <a:endParaRPr lang="en-US" sz="3200" dirty="0">
-              <a:latin typeface="Calibri" pitchFamily="34" charset="0"/>
-            </a:endParaRPr>
-          </a:p>
-          <a:p>
-            <a:pPr eaLnBrk="1" hangingPunct="1"/>
-            <a:r>
-              <a:rPr lang="en-US" sz="3200" dirty="0">
-                <a:latin typeface="Calibri" pitchFamily="34" charset="0"/>
-              </a:rPr>
-              <a:t>Zoom out to 100% to preview what this will look like on your printed poster.</a:t>
+              <a:t>combined with Ajax calls allowed us to retrieve data from our database and dynamically display that data on our web pages asynchronously</a:t>
             </a:r>
           </a:p>
         </p:txBody>
@@ -3476,7 +3482,7 @@
         <p:spPr bwMode="auto">
           <a:xfrm>
             <a:off x="28879800" y="14935200"/>
-            <a:ext cx="13167360" cy="7725191"/>
+            <a:ext cx="13167360" cy="6740306"/>
           </a:xfrm>
           <a:prstGeom prst="rect">
             <a:avLst/>
@@ -3598,12 +3604,30 @@
           <a:p>
             <a:pPr eaLnBrk="1" hangingPunct="1"/>
             <a:r>
+              <a:rPr lang="en-US" sz="3200" dirty="0" smtClean="0">
+                <a:latin typeface="Calibri" pitchFamily="34" charset="0"/>
+              </a:rPr>
+              <a:t>We took a lot of inspiration from similar fantasy sports sites such as </a:t>
+            </a:r>
+            <a:r>
               <a:rPr lang="en-US" sz="3200" b="1" dirty="0" smtClean="0">
                 <a:latin typeface="Calibri" pitchFamily="34" charset="0"/>
               </a:rPr>
-              <a:t>Talk about looking at other sites such as ESPN and Yahoo for inspiration here</a:t>
-            </a:r>
-            <a:endParaRPr lang="en-US" sz="3200" b="1" dirty="0">
+              <a:t>Yahoo </a:t>
+            </a:r>
+            <a:r>
+              <a:rPr lang="en-US" sz="3200" dirty="0" smtClean="0">
+                <a:latin typeface="Calibri" pitchFamily="34" charset="0"/>
+              </a:rPr>
+              <a:t>and </a:t>
+            </a:r>
+            <a:r>
+              <a:rPr lang="en-US" sz="3200" b="1" dirty="0" smtClean="0">
+                <a:latin typeface="Calibri" pitchFamily="34" charset="0"/>
+              </a:rPr>
+              <a:t>ESPN</a:t>
+            </a:r>
+            <a:endParaRPr lang="en-US" sz="3200" dirty="0" smtClean="0">
               <a:latin typeface="Calibri" pitchFamily="34" charset="0"/>
             </a:endParaRPr>
           </a:p>
@@ -3616,22 +3640,28 @@
           <a:p>
             <a:pPr eaLnBrk="1" hangingPunct="1"/>
             <a:r>
-              <a:rPr lang="en-US" sz="3200" dirty="0">
-                <a:latin typeface="Calibri" pitchFamily="34" charset="0"/>
-              </a:rPr>
-              <a:t>This text box will automatically re-size to your text. To turn off that feature, right click inside this box and go to </a:t>
-            </a:r>
-            <a:r>
-              <a:rPr lang="en-US" sz="3200" b="1" dirty="0">
-                <a:latin typeface="Calibri" pitchFamily="34" charset="0"/>
-              </a:rPr>
-              <a:t>Format Shape, Text Box, Autofit</a:t>
-            </a:r>
-            <a:r>
-              <a:rPr lang="en-US" sz="3200" dirty="0">
-                <a:latin typeface="Calibri" pitchFamily="34" charset="0"/>
-              </a:rPr>
-              <a:t>, and select the “Do Not Autofit” radio button.</a:t>
+              <a:rPr lang="en-US" sz="3200" dirty="0" smtClean="0">
+                <a:latin typeface="Calibri" pitchFamily="34" charset="0"/>
+              </a:rPr>
+              <a:t>The layout for the page where the user submits their picks was inspired by </a:t>
+            </a:r>
+            <a:r>
+              <a:rPr lang="en-US" sz="3200" b="1" dirty="0" smtClean="0">
+                <a:latin typeface="Calibri" pitchFamily="34" charset="0"/>
+              </a:rPr>
+              <a:t>Yahoo’s Pro Football </a:t>
+            </a:r>
+            <a:r>
+              <a:rPr lang="en-US" sz="3200" b="1" dirty="0" err="1" smtClean="0">
+                <a:latin typeface="Calibri" pitchFamily="34" charset="0"/>
+              </a:rPr>
+              <a:t>Pick’em</a:t>
+            </a:r>
+            <a:r>
+              <a:rPr lang="en-US" sz="3200" dirty="0" smtClean="0">
+                <a:latin typeface="Calibri" pitchFamily="34" charset="0"/>
+              </a:rPr>
+              <a:t>, which offers a simple, visually appealing design that makes it easy for the user to perform this core function of the site</a:t>
             </a:r>
           </a:p>
           <a:p>
@@ -3643,44 +3673,56 @@
           <a:p>
             <a:pPr eaLnBrk="1" hangingPunct="1"/>
             <a:r>
-              <a:rPr lang="en-US" sz="3200" dirty="0">
-                <a:latin typeface="Calibri" pitchFamily="34" charset="0"/>
-              </a:rPr>
-              <a:t>To change the font style of this text box: Click on the border once to highlight the entire text box, then select a different font or font size that suits you. This text is Calibri 32pt and is easily </a:t>
-            </a:r>
-            <a:r>
               <a:rPr lang="en-US" sz="3200" dirty="0" smtClean="0">
                 <a:latin typeface="Calibri" pitchFamily="34" charset="0"/>
               </a:rPr>
-              <a:t>read </a:t>
-            </a:r>
-            <a:r>
-              <a:rPr lang="en-US" sz="3200" dirty="0">
-                <a:latin typeface="Calibri" pitchFamily="34" charset="0"/>
-              </a:rPr>
-              <a:t>up to 5 feet away on a 36x48 poster</a:t>
+              <a:t>The inclusion of </a:t>
+            </a:r>
+            <a:r>
+              <a:rPr lang="en-US" sz="3200" smtClean="0">
+                <a:latin typeface="Calibri" pitchFamily="34" charset="0"/>
+              </a:rPr>
+              <a:t>a Twitter feed </a:t>
             </a:r>
             <a:r>
               <a:rPr lang="en-US" sz="3200" dirty="0" smtClean="0">
                 <a:latin typeface="Calibri" pitchFamily="34" charset="0"/>
               </a:rPr>
-              <a:t>.</a:t>
-            </a:r>
-          </a:p>
-          <a:p>
-            <a:pPr eaLnBrk="1" hangingPunct="1"/>
+              <a:t>on the home page was inspired by </a:t>
+            </a:r>
+            <a:r>
+              <a:rPr lang="en-US" sz="3200" b="1" dirty="0" smtClean="0">
+                <a:latin typeface="Calibri" pitchFamily="34" charset="0"/>
+              </a:rPr>
+              <a:t>ESPN’s </a:t>
+            </a:r>
+            <a:r>
+              <a:rPr lang="en-US" sz="3200" dirty="0" smtClean="0">
+                <a:latin typeface="Calibri" pitchFamily="34" charset="0"/>
+              </a:rPr>
+              <a:t>inclusion of a news feed on their fantasy sports home page, which </a:t>
+            </a:r>
+            <a:r>
+              <a:rPr lang="en-US" sz="3200" smtClean="0">
+                <a:latin typeface="Calibri" pitchFamily="34" charset="0"/>
+              </a:rPr>
+              <a:t>provides users </a:t>
+            </a:r>
+            <a:r>
+              <a:rPr lang="en-US" sz="3200" dirty="0" smtClean="0">
+                <a:latin typeface="Calibri" pitchFamily="34" charset="0"/>
+              </a:rPr>
+              <a:t>with valuable information without the inconvenience of having to leave </a:t>
+            </a:r>
+            <a:r>
+              <a:rPr lang="en-US" sz="3200" smtClean="0">
+                <a:latin typeface="Calibri" pitchFamily="34" charset="0"/>
+              </a:rPr>
+              <a:t>the site</a:t>
+            </a:r>
             <a:endParaRPr lang="en-US" sz="3200" dirty="0">
               <a:latin typeface="Calibri" pitchFamily="34" charset="0"/>
             </a:endParaRPr>
-          </a:p>
-          <a:p>
-            <a:pPr eaLnBrk="1" hangingPunct="1"/>
-            <a:r>
-              <a:rPr lang="en-US" sz="3200" dirty="0">
-                <a:latin typeface="Calibri" pitchFamily="34" charset="0"/>
-              </a:rPr>
-              <a:t>Zoom out to 100% to preview what this will look like on your printed poster.</a:t>
-            </a:r>
           </a:p>
         </p:txBody>
       </p:sp>
@@ -5023,144 +5065,6 @@
           </a:p>
         </p:txBody>
       </p:sp>
-      <p:sp>
-        <p:nvSpPr>
-          <p:cNvPr id="30" name="Rectangle 265"/>
-          <p:cNvSpPr>
-            <a:spLocks noChangeAspect="1" noChangeArrowheads="1"/>
-          </p:cNvSpPr>
-          <p:nvPr/>
-        </p:nvSpPr>
-        <p:spPr bwMode="auto">
-          <a:xfrm>
-            <a:off x="1005840" y="1005840"/>
-            <a:ext cx="2923773" cy="2194560"/>
-          </a:xfrm>
-          <a:prstGeom prst="rect">
-            <a:avLst/>
-          </a:prstGeom>
-          <a:blipFill dpi="0" rotWithShape="1">
-            <a:blip r:embed="rId5">
-              <a:lum bright="70000" contrast="-70000"/>
-            </a:blip>
-            <a:srcRect/>
-            <a:stretch>
-              <a:fillRect r="-79"/>
-            </a:stretch>
-          </a:blipFill>
-          <a:ln w="9525">
-            <a:solidFill>
-              <a:schemeClr val="tx1"/>
-            </a:solidFill>
-            <a:miter lim="800000"/>
-            <a:headEnd/>
-            <a:tailEnd/>
-          </a:ln>
-          <a:effectLst/>
-          <a:extLst>
-            <a:ext uri="{AF507438-7753-43e0-B8FC-AC1667EBCBE1}">
-              <a14:hiddenEffects xmlns:a14="http://schemas.microsoft.com/office/drawing/2010/main">
-                <a:effectLst>
-                  <a:outerShdw dist="35921" dir="2700000" algn="ctr" rotWithShape="0">
-                    <a:schemeClr val="bg2"/>
-                  </a:outerShdw>
-                </a:effectLst>
-              </a14:hiddenEffects>
-            </a:ext>
-          </a:extLst>
-        </p:spPr>
-        <p:txBody>
-          <a:bodyPr lIns="83814" tIns="41907" rIns="83814" bIns="41907" anchor="ctr"/>
-          <a:lstStyle/>
-          <a:p>
-            <a:pPr algn="ctr" defTabSz="4022725"/>
-            <a:r>
-              <a:rPr lang="en-US" sz="1800" b="1" dirty="0">
-                <a:latin typeface="Calibri" pitchFamily="34" charset="0"/>
-              </a:rPr>
-              <a:t>REPLACE THIS BOX WITH YOUR ORGANIZATION’S</a:t>
-            </a:r>
-          </a:p>
-          <a:p>
-            <a:pPr algn="ctr" defTabSz="4022725"/>
-            <a:r>
-              <a:rPr lang="en-US" sz="1800" b="1" dirty="0">
-                <a:latin typeface="Calibri" pitchFamily="34" charset="0"/>
-              </a:rPr>
-              <a:t>HIGH RESOLUTION LOGO</a:t>
-            </a:r>
-          </a:p>
-        </p:txBody>
-      </p:sp>
-      <p:sp>
-        <p:nvSpPr>
-          <p:cNvPr id="31" name="Rectangle 265"/>
-          <p:cNvSpPr>
-            <a:spLocks noChangeAspect="1" noChangeArrowheads="1"/>
-          </p:cNvSpPr>
-          <p:nvPr/>
-        </p:nvSpPr>
-        <p:spPr bwMode="auto">
-          <a:xfrm>
-            <a:off x="39959280" y="1005840"/>
-            <a:ext cx="2923773" cy="2194560"/>
-          </a:xfrm>
-          <a:prstGeom prst="rect">
-            <a:avLst/>
-          </a:prstGeom>
-          <a:blipFill dpi="0" rotWithShape="1">
-            <a:blip r:embed="rId5">
-              <a:lum bright="70000" contrast="-70000"/>
-            </a:blip>
-            <a:srcRect/>
-            <a:stretch>
-              <a:fillRect r="-79"/>
-            </a:stretch>
-          </a:blipFill>
-          <a:ln w="9525">
-            <a:solidFill>
-              <a:schemeClr val="tx1"/>
-            </a:solidFill>
-            <a:miter lim="800000"/>
-            <a:headEnd/>
-            <a:tailEnd/>
-          </a:ln>
-          <a:effectLst/>
-          <a:extLst>
-            <a:ext uri="{AF507438-7753-43e0-B8FC-AC1667EBCBE1}">
-              <a14:hiddenEffects xmlns:a14="http://schemas.microsoft.com/office/drawing/2010/main">
-                <a:effectLst>
-                  <a:outerShdw dist="35921" dir="2700000" algn="ctr" rotWithShape="0">
-                    <a:schemeClr val="bg2"/>
-                  </a:outerShdw>
-                </a:effectLst>
-              </a14:hiddenEffects>
-            </a:ext>
-          </a:extLst>
-        </p:spPr>
-        <p:txBody>
-          <a:bodyPr lIns="83814" tIns="41907" rIns="83814" bIns="41907" anchor="ctr"/>
-          <a:lstStyle/>
-          <a:p>
-            <a:pPr algn="ctr" defTabSz="4022725"/>
-            <a:r>
-              <a:rPr lang="en-US" sz="1800" b="1" dirty="0">
-                <a:latin typeface="Calibri" pitchFamily="34" charset="0"/>
-              </a:rPr>
-              <a:t>REPLACE THIS BOX WITH YOUR ORGANIZATION’S</a:t>
-            </a:r>
-          </a:p>
-          <a:p>
-            <a:pPr algn="ctr" defTabSz="4022725"/>
-            <a:r>
-              <a:rPr lang="en-US" sz="1800" b="1" dirty="0">
-                <a:latin typeface="Calibri" pitchFamily="34" charset="0"/>
-              </a:rPr>
-              <a:t>HIGH RESOLUTION LOGO</a:t>
-            </a:r>
-          </a:p>
-        </p:txBody>
-      </p:sp>
       <p:pic>
         <p:nvPicPr>
           <p:cNvPr id="2" name="Picture 1"/>
@@ -5170,7 +5074,7 @@
           <p:nvPr/>
         </p:nvPicPr>
         <p:blipFill>
-          <a:blip r:embed="rId6"/>
+          <a:blip r:embed="rId5"/>
           <a:stretch>
             <a:fillRect/>
           </a:stretch>
@@ -5194,7 +5098,7 @@
           <p:nvPr/>
         </p:nvPicPr>
         <p:blipFill>
-          <a:blip r:embed="rId7"/>
+          <a:blip r:embed="rId6"/>
           <a:stretch>
             <a:fillRect/>
           </a:stretch>
@@ -5216,7 +5120,7 @@
           <p:nvPr/>
         </p:nvPicPr>
         <p:blipFill>
-          <a:blip r:embed="rId8">
+          <a:blip r:embed="rId7">
             <a:extLst>
               <a:ext uri="{28A0092B-C50C-407E-A947-70E740481C1C}">
                 <a14:useLocalDpi xmlns:a14="http://schemas.microsoft.com/office/drawing/2010/main" val="0"/>
@@ -5268,7 +5172,7 @@
           <p:nvPr/>
         </p:nvPicPr>
         <p:blipFill>
-          <a:blip r:embed="rId9">
+          <a:blip r:embed="rId8">
             <a:extLst>
               <a:ext uri="{28A0092B-C50C-407E-A947-70E740481C1C}">
                 <a14:useLocalDpi xmlns:a14="http://schemas.microsoft.com/office/drawing/2010/main" val="0"/>
@@ -5343,6 +5247,72 @@
           </a:p>
         </p:txBody>
       </p:sp>
+      <p:pic>
+        <p:nvPicPr>
+          <p:cNvPr id="8" name="Picture 7" descr="sju_red.pdf"/>
+          <p:cNvPicPr>
+            <a:picLocks noChangeAspect="1"/>
+          </p:cNvPicPr>
+          <p:nvPr/>
+        </p:nvPicPr>
+        <p:blipFill>
+          <a:blip r:embed="rId9">
+            <a:extLst>
+              <a:ext uri="{28A0092B-C50C-407E-A947-70E740481C1C}">
+                <a14:useLocalDpi xmlns:a14="http://schemas.microsoft.com/office/drawing/2010/main" val="0"/>
+              </a:ext>
+            </a:extLst>
+          </a:blip>
+          <a:stretch>
+            <a:fillRect/>
+          </a:stretch>
+        </p:blipFill>
+        <p:spPr>
+          <a:xfrm>
+            <a:off x="990600" y="533400"/>
+            <a:ext cx="3124200" cy="3139694"/>
+          </a:xfrm>
+          <a:prstGeom prst="rect">
+            <a:avLst/>
+          </a:prstGeom>
+          <a:solidFill>
+            <a:schemeClr val="bg1"/>
+          </a:solidFill>
+        </p:spPr>
+      </p:pic>
+      <p:pic>
+        <p:nvPicPr>
+          <p:cNvPr id="41" name="Picture 40" descr="sju_red.pdf"/>
+          <p:cNvPicPr>
+            <a:picLocks noChangeAspect="1"/>
+          </p:cNvPicPr>
+          <p:nvPr/>
+        </p:nvPicPr>
+        <p:blipFill>
+          <a:blip r:embed="rId9">
+            <a:extLst>
+              <a:ext uri="{28A0092B-C50C-407E-A947-70E740481C1C}">
+                <a14:useLocalDpi xmlns:a14="http://schemas.microsoft.com/office/drawing/2010/main" val="0"/>
+              </a:ext>
+            </a:extLst>
+          </a:blip>
+          <a:stretch>
+            <a:fillRect/>
+          </a:stretch>
+        </p:blipFill>
+        <p:spPr>
+          <a:xfrm>
+            <a:off x="40005000" y="533400"/>
+            <a:ext cx="3124200" cy="3139694"/>
+          </a:xfrm>
+          <a:prstGeom prst="rect">
+            <a:avLst/>
+          </a:prstGeom>
+          <a:solidFill>
+            <a:schemeClr val="bg1"/>
+          </a:solidFill>
+        </p:spPr>
+      </p:pic>
     </p:spTree>
     <p:extLst>
       <p:ext uri="{BB962C8B-B14F-4D97-AF65-F5344CB8AC3E}">

</xml_diff>

<commit_message>
home page screenshot included
</commit_message>
<xml_diff>
--- a/Important Docs and Links/NFL-Picks Poster.pptx
+++ b/Important Docs and Links/NFL-Picks Poster.pptx
@@ -109,7 +109,7 @@
   </p:defaultTextStyle>
   <p:extLst>
     <p:ext uri="{EFAFB233-063F-42B5-8137-9DF3F51BA10A}">
-      <p15:sldGuideLst xmlns="" xmlns:p15="http://schemas.microsoft.com/office/powerpoint/2012/main">
+      <p15:sldGuideLst xmlns:p15="http://schemas.microsoft.com/office/powerpoint/2012/main" xmlns="">
         <p15:guide id="1" orient="horz" pos="10368">
           <p15:clr>
             <a:srgbClr val="A4A3A4"/>
@@ -208,7 +208,7 @@
           <a:p>
             <a:fld id="{CC7D2A02-BA2D-F748-A7F0-8EF1DA740F06}" type="datetimeFigureOut">
               <a:rPr lang="en-US" smtClean="0"/>
-              <a:t>4/3/2017</a:t>
+              <a:t>4/5/2017</a:t>
             </a:fld>
             <a:endParaRPr lang="en-US"/>
           </a:p>
@@ -955,7 +955,7 @@
           <a:p>
             <a:fld id="{985D6BDF-9D0E-4E2B-85B8-D8F4790360C9}" type="datetimeFigureOut">
               <a:rPr lang="en-US" smtClean="0"/>
-              <a:t>4/3/2017</a:t>
+              <a:t>4/5/2017</a:t>
             </a:fld>
             <a:endParaRPr lang="en-US" dirty="0"/>
           </a:p>
@@ -1175,7 +1175,7 @@
           <a:p>
             <a:fld id="{985D6BDF-9D0E-4E2B-85B8-D8F4790360C9}" type="datetimeFigureOut">
               <a:rPr lang="en-US" smtClean="0"/>
-              <a:t>4/3/2017</a:t>
+              <a:t>4/5/2017</a:t>
             </a:fld>
             <a:endParaRPr lang="en-US" dirty="0"/>
           </a:p>
@@ -2490,7 +2490,7 @@
         </p:nvSpPr>
         <p:spPr bwMode="auto">
           <a:xfrm>
-            <a:off x="15361920" y="14933770"/>
+            <a:off x="28885055" y="14935203"/>
             <a:ext cx="13167360" cy="7232749"/>
           </a:xfrm>
           <a:prstGeom prst="rect">
@@ -3463,329 +3463,6 @@
       </p:sp>
       <p:sp>
         <p:nvSpPr>
-          <p:cNvPr id="14" name="Text Box 193"/>
-          <p:cNvSpPr txBox="1">
-            <a:spLocks noChangeArrowheads="1"/>
-          </p:cNvSpPr>
-          <p:nvPr/>
-        </p:nvSpPr>
-        <p:spPr bwMode="auto">
-          <a:xfrm>
-            <a:off x="28879800" y="14935200"/>
-            <a:ext cx="13167360" cy="6740306"/>
-          </a:xfrm>
-          <a:prstGeom prst="rect">
-            <a:avLst/>
-          </a:prstGeom>
-          <a:solidFill>
-            <a:schemeClr val="bg1"/>
-          </a:solidFill>
-          <a:ln w="12700">
-            <a:solidFill>
-              <a:schemeClr val="accent1">
-                <a:lumMod val="75000"/>
-              </a:schemeClr>
-            </a:solidFill>
-          </a:ln>
-          <a:effectLst/>
-        </p:spPr>
-        <p:txBody>
-          <a:bodyPr lIns="365760" tIns="457200" rIns="365760" bIns="365760">
-            <a:spAutoFit/>
-          </a:bodyPr>
-          <a:lstStyle>
-            <a:lvl1pPr eaLnBrk="0" hangingPunct="0">
-              <a:defRPr sz="2200">
-                <a:solidFill>
-                  <a:schemeClr val="tx1"/>
-                </a:solidFill>
-                <a:latin typeface="Arial" charset="0"/>
-              </a:defRPr>
-            </a:lvl1pPr>
-            <a:lvl2pPr marL="742950" indent="-285750" eaLnBrk="0" hangingPunct="0">
-              <a:defRPr sz="2200">
-                <a:solidFill>
-                  <a:schemeClr val="tx1"/>
-                </a:solidFill>
-                <a:latin typeface="Arial" charset="0"/>
-              </a:defRPr>
-            </a:lvl2pPr>
-            <a:lvl3pPr marL="1143000" indent="-228600" eaLnBrk="0" hangingPunct="0">
-              <a:defRPr sz="2200">
-                <a:solidFill>
-                  <a:schemeClr val="tx1"/>
-                </a:solidFill>
-                <a:latin typeface="Arial" charset="0"/>
-              </a:defRPr>
-            </a:lvl3pPr>
-            <a:lvl4pPr marL="1600200" indent="-228600" eaLnBrk="0" hangingPunct="0">
-              <a:defRPr sz="2200">
-                <a:solidFill>
-                  <a:schemeClr val="tx1"/>
-                </a:solidFill>
-                <a:latin typeface="Arial" charset="0"/>
-              </a:defRPr>
-            </a:lvl4pPr>
-            <a:lvl5pPr marL="2057400" indent="-228600" eaLnBrk="0" hangingPunct="0">
-              <a:defRPr sz="2200">
-                <a:solidFill>
-                  <a:schemeClr val="tx1"/>
-                </a:solidFill>
-                <a:latin typeface="Arial" charset="0"/>
-              </a:defRPr>
-            </a:lvl5pPr>
-            <a:lvl6pPr marL="2514600" indent="-228600" eaLnBrk="0" fontAlgn="base" hangingPunct="0">
-              <a:spcBef>
-                <a:spcPct val="0"/>
-              </a:spcBef>
-              <a:spcAft>
-                <a:spcPct val="0"/>
-              </a:spcAft>
-              <a:defRPr sz="2200">
-                <a:solidFill>
-                  <a:schemeClr val="tx1"/>
-                </a:solidFill>
-                <a:latin typeface="Arial" charset="0"/>
-              </a:defRPr>
-            </a:lvl6pPr>
-            <a:lvl7pPr marL="2971800" indent="-228600" eaLnBrk="0" fontAlgn="base" hangingPunct="0">
-              <a:spcBef>
-                <a:spcPct val="0"/>
-              </a:spcBef>
-              <a:spcAft>
-                <a:spcPct val="0"/>
-              </a:spcAft>
-              <a:defRPr sz="2200">
-                <a:solidFill>
-                  <a:schemeClr val="tx1"/>
-                </a:solidFill>
-                <a:latin typeface="Arial" charset="0"/>
-              </a:defRPr>
-            </a:lvl7pPr>
-            <a:lvl8pPr marL="3429000" indent="-228600" eaLnBrk="0" fontAlgn="base" hangingPunct="0">
-              <a:spcBef>
-                <a:spcPct val="0"/>
-              </a:spcBef>
-              <a:spcAft>
-                <a:spcPct val="0"/>
-              </a:spcAft>
-              <a:defRPr sz="2200">
-                <a:solidFill>
-                  <a:schemeClr val="tx1"/>
-                </a:solidFill>
-                <a:latin typeface="Arial" charset="0"/>
-              </a:defRPr>
-            </a:lvl8pPr>
-            <a:lvl9pPr marL="3886200" indent="-228600" eaLnBrk="0" fontAlgn="base" hangingPunct="0">
-              <a:spcBef>
-                <a:spcPct val="0"/>
-              </a:spcBef>
-              <a:spcAft>
-                <a:spcPct val="0"/>
-              </a:spcAft>
-              <a:defRPr sz="2200">
-                <a:solidFill>
-                  <a:schemeClr val="tx1"/>
-                </a:solidFill>
-                <a:latin typeface="Arial" charset="0"/>
-              </a:defRPr>
-            </a:lvl9pPr>
-          </a:lstStyle>
-          <a:p>
-            <a:pPr eaLnBrk="1" hangingPunct="1"/>
-            <a:r>
-              <a:rPr lang="en-US" sz="3200" dirty="0" smtClean="0">
-                <a:latin typeface="Calibri" pitchFamily="34" charset="0"/>
-              </a:rPr>
-              <a:t>We took a lot of inspiration from similar fantasy sports sites such as </a:t>
-            </a:r>
-            <a:r>
-              <a:rPr lang="en-US" sz="3200" b="1" dirty="0" smtClean="0">
-                <a:latin typeface="Calibri" pitchFamily="34" charset="0"/>
-              </a:rPr>
-              <a:t>Yahoo </a:t>
-            </a:r>
-            <a:r>
-              <a:rPr lang="en-US" sz="3200" dirty="0" smtClean="0">
-                <a:latin typeface="Calibri" pitchFamily="34" charset="0"/>
-              </a:rPr>
-              <a:t>and </a:t>
-            </a:r>
-            <a:r>
-              <a:rPr lang="en-US" sz="3200" b="1" dirty="0" smtClean="0">
-                <a:latin typeface="Calibri" pitchFamily="34" charset="0"/>
-              </a:rPr>
-              <a:t>ESPN</a:t>
-            </a:r>
-            <a:endParaRPr lang="en-US" sz="3200" dirty="0" smtClean="0">
-              <a:latin typeface="Calibri" pitchFamily="34" charset="0"/>
-            </a:endParaRPr>
-          </a:p>
-          <a:p>
-            <a:pPr eaLnBrk="1" hangingPunct="1"/>
-            <a:endParaRPr lang="en-US" sz="3200" dirty="0">
-              <a:latin typeface="Calibri" pitchFamily="34" charset="0"/>
-            </a:endParaRPr>
-          </a:p>
-          <a:p>
-            <a:pPr eaLnBrk="1" hangingPunct="1"/>
-            <a:r>
-              <a:rPr lang="en-US" sz="3200" dirty="0" smtClean="0">
-                <a:latin typeface="Calibri" pitchFamily="34" charset="0"/>
-              </a:rPr>
-              <a:t>The layout for the page where the user submits their picks was inspired by </a:t>
-            </a:r>
-            <a:r>
-              <a:rPr lang="en-US" sz="3200" b="1" dirty="0" smtClean="0">
-                <a:latin typeface="Calibri" pitchFamily="34" charset="0"/>
-              </a:rPr>
-              <a:t>Yahoo’s Pro Football </a:t>
-            </a:r>
-            <a:r>
-              <a:rPr lang="en-US" sz="3200" b="1" dirty="0" err="1" smtClean="0">
-                <a:latin typeface="Calibri" pitchFamily="34" charset="0"/>
-              </a:rPr>
-              <a:t>Pick’em</a:t>
-            </a:r>
-            <a:r>
-              <a:rPr lang="en-US" sz="3200" dirty="0" smtClean="0">
-                <a:latin typeface="Calibri" pitchFamily="34" charset="0"/>
-              </a:rPr>
-              <a:t>, which offers a simple, visually appealing design that makes it easy for the user to perform this core function of the site</a:t>
-            </a:r>
-          </a:p>
-          <a:p>
-            <a:pPr eaLnBrk="1" hangingPunct="1"/>
-            <a:endParaRPr lang="en-US" sz="3200" dirty="0">
-              <a:latin typeface="Calibri" pitchFamily="34" charset="0"/>
-            </a:endParaRPr>
-          </a:p>
-          <a:p>
-            <a:pPr eaLnBrk="1" hangingPunct="1"/>
-            <a:r>
-              <a:rPr lang="en-US" sz="3200" dirty="0" smtClean="0">
-                <a:latin typeface="Calibri" pitchFamily="34" charset="0"/>
-              </a:rPr>
-              <a:t>The inclusion of </a:t>
-            </a:r>
-            <a:r>
-              <a:rPr lang="en-US" sz="3200" smtClean="0">
-                <a:latin typeface="Calibri" pitchFamily="34" charset="0"/>
-              </a:rPr>
-              <a:t>a Twitter feed </a:t>
-            </a:r>
-            <a:r>
-              <a:rPr lang="en-US" sz="3200" dirty="0" smtClean="0">
-                <a:latin typeface="Calibri" pitchFamily="34" charset="0"/>
-              </a:rPr>
-              <a:t>on the home page was inspired by </a:t>
-            </a:r>
-            <a:r>
-              <a:rPr lang="en-US" sz="3200" b="1" dirty="0" smtClean="0">
-                <a:latin typeface="Calibri" pitchFamily="34" charset="0"/>
-              </a:rPr>
-              <a:t>ESPN’s </a:t>
-            </a:r>
-            <a:r>
-              <a:rPr lang="en-US" sz="3200" dirty="0" smtClean="0">
-                <a:latin typeface="Calibri" pitchFamily="34" charset="0"/>
-              </a:rPr>
-              <a:t>inclusion of a news feed on their fantasy sports home page, which </a:t>
-            </a:r>
-            <a:r>
-              <a:rPr lang="en-US" sz="3200" smtClean="0">
-                <a:latin typeface="Calibri" pitchFamily="34" charset="0"/>
-              </a:rPr>
-              <a:t>provides users </a:t>
-            </a:r>
-            <a:r>
-              <a:rPr lang="en-US" sz="3200" dirty="0" smtClean="0">
-                <a:latin typeface="Calibri" pitchFamily="34" charset="0"/>
-              </a:rPr>
-              <a:t>with valuable information without the inconvenience of having to leave </a:t>
-            </a:r>
-            <a:r>
-              <a:rPr lang="en-US" sz="3200" smtClean="0">
-                <a:latin typeface="Calibri" pitchFamily="34" charset="0"/>
-              </a:rPr>
-              <a:t>the site</a:t>
-            </a:r>
-            <a:endParaRPr lang="en-US" sz="3200" dirty="0">
-              <a:latin typeface="Calibri" pitchFamily="34" charset="0"/>
-            </a:endParaRPr>
-          </a:p>
-        </p:txBody>
-      </p:sp>
-      <p:sp>
-        <p:nvSpPr>
-          <p:cNvPr id="36" name="Rectangle 35"/>
-          <p:cNvSpPr/>
-          <p:nvPr/>
-        </p:nvSpPr>
-        <p:spPr>
-          <a:xfrm>
-            <a:off x="28879800" y="14249400"/>
-            <a:ext cx="13167360" cy="685800"/>
-          </a:xfrm>
-          <a:prstGeom prst="rect">
-            <a:avLst/>
-          </a:prstGeom>
-          <a:solidFill>
-            <a:schemeClr val="accent1">
-              <a:lumMod val="75000"/>
-            </a:schemeClr>
-          </a:solidFill>
-          <a:ln w="12700"/>
-        </p:spPr>
-        <p:style>
-          <a:lnRef idx="2">
-            <a:schemeClr val="accent1">
-              <a:shade val="50000"/>
-            </a:schemeClr>
-          </a:lnRef>
-          <a:fillRef idx="1">
-            <a:schemeClr val="accent1"/>
-          </a:fillRef>
-          <a:effectRef idx="0">
-            <a:schemeClr val="accent1"/>
-          </a:effectRef>
-          <a:fontRef idx="minor">
-            <a:schemeClr val="lt1"/>
-          </a:fontRef>
-        </p:style>
-        <p:txBody>
-          <a:bodyPr lIns="68568" tIns="34284" rIns="68568" bIns="34284" rtlCol="0" anchor="ctr"/>
-          <a:lstStyle/>
-          <a:p>
-            <a:pPr algn="ctr"/>
-            <a:r>
-              <a:rPr lang="en-US" sz="4400" b="1" dirty="0" smtClean="0">
-                <a:solidFill>
-                  <a:schemeClr val="bg1"/>
-                </a:solidFill>
-                <a:effectLst>
-                  <a:outerShdw blurRad="50800" dist="50800" dir="5400000" algn="ctr" rotWithShape="0">
-                    <a:schemeClr val="tx1"/>
-                  </a:outerShdw>
-                </a:effectLst>
-              </a:rPr>
-              <a:t>Taking Inspiration</a:t>
-            </a:r>
-            <a:endParaRPr lang="en-US" sz="4400" b="1" dirty="0">
-              <a:solidFill>
-                <a:schemeClr val="bg1"/>
-              </a:solidFill>
-              <a:effectLst>
-                <a:outerShdw blurRad="50800" dist="50800" dir="5400000" algn="ctr" rotWithShape="0">
-                  <a:schemeClr val="tx1"/>
-                </a:outerShdw>
-              </a:effectLst>
-            </a:endParaRPr>
-          </a:p>
-        </p:txBody>
-      </p:sp>
-      <p:sp>
-        <p:nvSpPr>
           <p:cNvPr id="11" name="Text Box 190"/>
           <p:cNvSpPr txBox="1">
             <a:spLocks noChangeArrowheads="1"/>
@@ -4038,7 +3715,7 @@
         </p:nvSpPr>
         <p:spPr>
           <a:xfrm>
-            <a:off x="15361920" y="14247970"/>
+            <a:off x="28885055" y="14247970"/>
             <a:ext cx="13167360" cy="685800"/>
           </a:xfrm>
           <a:prstGeom prst="rect">
@@ -4730,172 +4407,6 @@
           </a:extLst>
         </p:spPr>
       </p:pic>
-      <p:sp>
-        <p:nvSpPr>
-          <p:cNvPr id="31" name="Text Box 181"/>
-          <p:cNvSpPr txBox="1">
-            <a:spLocks noChangeArrowheads="1"/>
-          </p:cNvSpPr>
-          <p:nvPr/>
-        </p:nvSpPr>
-        <p:spPr bwMode="auto">
-          <a:xfrm>
-            <a:off x="34774571" y="31004970"/>
-            <a:ext cx="1447800" cy="563451"/>
-          </a:xfrm>
-          <a:prstGeom prst="rect">
-            <a:avLst/>
-          </a:prstGeom>
-          <a:noFill/>
-          <a:ln>
-            <a:noFill/>
-          </a:ln>
-          <a:effectLst/>
-          <a:extLst>
-            <a:ext uri="{909E8E84-426E-40DD-AFC4-6F175D3DCCD1}">
-              <a14:hiddenFill xmlns:a14="http://schemas.microsoft.com/office/drawing/2010/main">
-                <a:solidFill>
-                  <a:schemeClr val="accent1"/>
-                </a:solidFill>
-              </a14:hiddenFill>
-            </a:ext>
-            <a:ext uri="{91240B29-F687-4F45-9708-019B960494DF}">
-              <a14:hiddenLine xmlns:a14="http://schemas.microsoft.com/office/drawing/2010/main" w="9525">
-                <a:solidFill>
-                  <a:schemeClr val="tx1"/>
-                </a:solidFill>
-                <a:miter lim="800000"/>
-                <a:headEnd/>
-                <a:tailEnd/>
-              </a14:hiddenLine>
-            </a:ext>
-            <a:ext uri="{AF507438-7753-43E0-B8FC-AC1667EBCBE1}">
-              <a14:hiddenEffects xmlns:a14="http://schemas.microsoft.com/office/drawing/2010/main">
-                <a:effectLst>
-                  <a:outerShdw dist="35921" dir="2700000" algn="ctr" rotWithShape="0">
-                    <a:schemeClr val="bg2"/>
-                  </a:outerShdw>
-                </a:effectLst>
-              </a14:hiddenEffects>
-            </a:ext>
-          </a:extLst>
-        </p:spPr>
-        <p:txBody>
-          <a:bodyPr wrap="square" lIns="68568" tIns="34284" rIns="68568" bIns="34284">
-            <a:spAutoFit/>
-          </a:bodyPr>
-          <a:lstStyle>
-            <a:lvl1pPr defTabSz="4389438" eaLnBrk="0" hangingPunct="0">
-              <a:defRPr sz="2200">
-                <a:solidFill>
-                  <a:schemeClr val="tx1"/>
-                </a:solidFill>
-                <a:latin typeface="Arial" charset="0"/>
-              </a:defRPr>
-            </a:lvl1pPr>
-            <a:lvl2pPr marL="742950" indent="-285750" defTabSz="4389438" eaLnBrk="0" hangingPunct="0">
-              <a:defRPr sz="2200">
-                <a:solidFill>
-                  <a:schemeClr val="tx1"/>
-                </a:solidFill>
-                <a:latin typeface="Arial" charset="0"/>
-              </a:defRPr>
-            </a:lvl2pPr>
-            <a:lvl3pPr marL="1143000" indent="-228600" defTabSz="4389438" eaLnBrk="0" hangingPunct="0">
-              <a:defRPr sz="2200">
-                <a:solidFill>
-                  <a:schemeClr val="tx1"/>
-                </a:solidFill>
-                <a:latin typeface="Arial" charset="0"/>
-              </a:defRPr>
-            </a:lvl3pPr>
-            <a:lvl4pPr marL="1600200" indent="-228600" defTabSz="4389438" eaLnBrk="0" hangingPunct="0">
-              <a:defRPr sz="2200">
-                <a:solidFill>
-                  <a:schemeClr val="tx1"/>
-                </a:solidFill>
-                <a:latin typeface="Arial" charset="0"/>
-              </a:defRPr>
-            </a:lvl4pPr>
-            <a:lvl5pPr marL="2057400" indent="-228600" defTabSz="4389438" eaLnBrk="0" hangingPunct="0">
-              <a:defRPr sz="2200">
-                <a:solidFill>
-                  <a:schemeClr val="tx1"/>
-                </a:solidFill>
-                <a:latin typeface="Arial" charset="0"/>
-              </a:defRPr>
-            </a:lvl5pPr>
-            <a:lvl6pPr marL="2514600" indent="-228600" defTabSz="4389438" eaLnBrk="0" fontAlgn="base" hangingPunct="0">
-              <a:spcBef>
-                <a:spcPct val="0"/>
-              </a:spcBef>
-              <a:spcAft>
-                <a:spcPct val="0"/>
-              </a:spcAft>
-              <a:defRPr sz="2200">
-                <a:solidFill>
-                  <a:schemeClr val="tx1"/>
-                </a:solidFill>
-                <a:latin typeface="Arial" charset="0"/>
-              </a:defRPr>
-            </a:lvl6pPr>
-            <a:lvl7pPr marL="2971800" indent="-228600" defTabSz="4389438" eaLnBrk="0" fontAlgn="base" hangingPunct="0">
-              <a:spcBef>
-                <a:spcPct val="0"/>
-              </a:spcBef>
-              <a:spcAft>
-                <a:spcPct val="0"/>
-              </a:spcAft>
-              <a:defRPr sz="2200">
-                <a:solidFill>
-                  <a:schemeClr val="tx1"/>
-                </a:solidFill>
-                <a:latin typeface="Arial" charset="0"/>
-              </a:defRPr>
-            </a:lvl7pPr>
-            <a:lvl8pPr marL="3429000" indent="-228600" defTabSz="4389438" eaLnBrk="0" fontAlgn="base" hangingPunct="0">
-              <a:spcBef>
-                <a:spcPct val="0"/>
-              </a:spcBef>
-              <a:spcAft>
-                <a:spcPct val="0"/>
-              </a:spcAft>
-              <a:defRPr sz="2200">
-                <a:solidFill>
-                  <a:schemeClr val="tx1"/>
-                </a:solidFill>
-                <a:latin typeface="Arial" charset="0"/>
-              </a:defRPr>
-            </a:lvl8pPr>
-            <a:lvl9pPr marL="3886200" indent="-228600" defTabSz="4389438" eaLnBrk="0" fontAlgn="base" hangingPunct="0">
-              <a:spcBef>
-                <a:spcPct val="0"/>
-              </a:spcBef>
-              <a:spcAft>
-                <a:spcPct val="0"/>
-              </a:spcAft>
-              <a:defRPr sz="2200">
-                <a:solidFill>
-                  <a:schemeClr val="tx1"/>
-                </a:solidFill>
-                <a:latin typeface="Arial" charset="0"/>
-              </a:defRPr>
-            </a:lvl9pPr>
-          </a:lstStyle>
-          <a:p>
-            <a:pPr eaLnBrk="1" hangingPunct="1"/>
-            <a:r>
-              <a:rPr lang="en-US" sz="3200" b="1" dirty="0" smtClean="0">
-                <a:latin typeface="Calibri" pitchFamily="34" charset="0"/>
-              </a:rPr>
-              <a:t>Win!</a:t>
-            </a:r>
-            <a:endParaRPr lang="en-US" sz="3200" dirty="0">
-              <a:latin typeface="Calibri" pitchFamily="34" charset="0"/>
-            </a:endParaRPr>
-          </a:p>
-        </p:txBody>
-      </p:sp>
       <p:pic>
         <p:nvPicPr>
           <p:cNvPr id="1029" name="Picture 5" descr="C:\Users\Lou\Desktop\win_ss.PNG"/>
@@ -4937,6 +4448,379 @@
           </a:extLst>
         </p:spPr>
       </p:pic>
+      <p:pic>
+        <p:nvPicPr>
+          <p:cNvPr id="3" name="Picture 2" descr="C:\Users\Lou\Desktop\home_page_updated_Ss.PNG"/>
+          <p:cNvPicPr>
+            <a:picLocks noChangeAspect="1" noChangeArrowheads="1"/>
+          </p:cNvPicPr>
+          <p:nvPr/>
+        </p:nvPicPr>
+        <p:blipFill>
+          <a:blip r:embed="rId11">
+            <a:extLst>
+              <a:ext uri="{28A0092B-C50C-407E-A947-70E740481C1C}">
+                <a14:useLocalDpi xmlns:a14="http://schemas.microsoft.com/office/drawing/2010/main" val="0"/>
+              </a:ext>
+            </a:extLst>
+          </a:blip>
+          <a:srcRect/>
+          <a:stretch>
+            <a:fillRect/>
+          </a:stretch>
+        </p:blipFill>
+        <p:spPr bwMode="auto">
+          <a:xfrm>
+            <a:off x="15361920" y="14315580"/>
+            <a:ext cx="13167360" cy="6659899"/>
+          </a:xfrm>
+          <a:prstGeom prst="rect">
+            <a:avLst/>
+          </a:prstGeom>
+          <a:noFill/>
+          <a:extLst>
+            <a:ext uri="{909E8E84-426E-40DD-AFC4-6F175D3DCCD1}">
+              <a14:hiddenFill xmlns:a14="http://schemas.microsoft.com/office/drawing/2010/main">
+                <a:solidFill>
+                  <a:srgbClr val="FFFFFF"/>
+                </a:solidFill>
+              </a14:hiddenFill>
+            </a:ext>
+          </a:extLst>
+        </p:spPr>
+      </p:pic>
+      <p:sp>
+        <p:nvSpPr>
+          <p:cNvPr id="29" name="Text Box 181"/>
+          <p:cNvSpPr txBox="1">
+            <a:spLocks noChangeArrowheads="1"/>
+          </p:cNvSpPr>
+          <p:nvPr/>
+        </p:nvSpPr>
+        <p:spPr bwMode="auto">
+          <a:xfrm>
+            <a:off x="20480660" y="22138056"/>
+            <a:ext cx="2929880" cy="561680"/>
+          </a:xfrm>
+          <a:prstGeom prst="rect">
+            <a:avLst/>
+          </a:prstGeom>
+          <a:noFill/>
+          <a:ln>
+            <a:noFill/>
+          </a:ln>
+          <a:effectLst/>
+          <a:extLst>
+            <a:ext uri="{909E8E84-426E-40DD-AFC4-6F175D3DCCD1}">
+              <a14:hiddenFill xmlns:a14="http://schemas.microsoft.com/office/drawing/2010/main">
+                <a:solidFill>
+                  <a:schemeClr val="accent1"/>
+                </a:solidFill>
+              </a14:hiddenFill>
+            </a:ext>
+            <a:ext uri="{91240B29-F687-4F45-9708-019B960494DF}">
+              <a14:hiddenLine xmlns:a14="http://schemas.microsoft.com/office/drawing/2010/main" w="9525">
+                <a:solidFill>
+                  <a:schemeClr val="tx1"/>
+                </a:solidFill>
+                <a:miter lim="800000"/>
+                <a:headEnd/>
+                <a:tailEnd/>
+              </a14:hiddenLine>
+            </a:ext>
+            <a:ext uri="{AF507438-7753-43E0-B8FC-AC1667EBCBE1}">
+              <a14:hiddenEffects xmlns:a14="http://schemas.microsoft.com/office/drawing/2010/main">
+                <a:effectLst>
+                  <a:outerShdw dist="35921" dir="2700000" algn="ctr" rotWithShape="0">
+                    <a:schemeClr val="bg2"/>
+                  </a:outerShdw>
+                </a:effectLst>
+              </a14:hiddenEffects>
+            </a:ext>
+          </a:extLst>
+        </p:spPr>
+        <p:txBody>
+          <a:bodyPr wrap="none" lIns="68568" tIns="34284" rIns="68568" bIns="34284">
+            <a:spAutoFit/>
+          </a:bodyPr>
+          <a:lstStyle>
+            <a:lvl1pPr defTabSz="4389438" eaLnBrk="0" hangingPunct="0">
+              <a:defRPr sz="2200">
+                <a:solidFill>
+                  <a:schemeClr val="tx1"/>
+                </a:solidFill>
+                <a:latin typeface="Arial" charset="0"/>
+              </a:defRPr>
+            </a:lvl1pPr>
+            <a:lvl2pPr marL="742950" indent="-285750" defTabSz="4389438" eaLnBrk="0" hangingPunct="0">
+              <a:defRPr sz="2200">
+                <a:solidFill>
+                  <a:schemeClr val="tx1"/>
+                </a:solidFill>
+                <a:latin typeface="Arial" charset="0"/>
+              </a:defRPr>
+            </a:lvl2pPr>
+            <a:lvl3pPr marL="1143000" indent="-228600" defTabSz="4389438" eaLnBrk="0" hangingPunct="0">
+              <a:defRPr sz="2200">
+                <a:solidFill>
+                  <a:schemeClr val="tx1"/>
+                </a:solidFill>
+                <a:latin typeface="Arial" charset="0"/>
+              </a:defRPr>
+            </a:lvl3pPr>
+            <a:lvl4pPr marL="1600200" indent="-228600" defTabSz="4389438" eaLnBrk="0" hangingPunct="0">
+              <a:defRPr sz="2200">
+                <a:solidFill>
+                  <a:schemeClr val="tx1"/>
+                </a:solidFill>
+                <a:latin typeface="Arial" charset="0"/>
+              </a:defRPr>
+            </a:lvl4pPr>
+            <a:lvl5pPr marL="2057400" indent="-228600" defTabSz="4389438" eaLnBrk="0" hangingPunct="0">
+              <a:defRPr sz="2200">
+                <a:solidFill>
+                  <a:schemeClr val="tx1"/>
+                </a:solidFill>
+                <a:latin typeface="Arial" charset="0"/>
+              </a:defRPr>
+            </a:lvl5pPr>
+            <a:lvl6pPr marL="2514600" indent="-228600" defTabSz="4389438" eaLnBrk="0" fontAlgn="base" hangingPunct="0">
+              <a:spcBef>
+                <a:spcPct val="0"/>
+              </a:spcBef>
+              <a:spcAft>
+                <a:spcPct val="0"/>
+              </a:spcAft>
+              <a:defRPr sz="2200">
+                <a:solidFill>
+                  <a:schemeClr val="tx1"/>
+                </a:solidFill>
+                <a:latin typeface="Arial" charset="0"/>
+              </a:defRPr>
+            </a:lvl6pPr>
+            <a:lvl7pPr marL="2971800" indent="-228600" defTabSz="4389438" eaLnBrk="0" fontAlgn="base" hangingPunct="0">
+              <a:spcBef>
+                <a:spcPct val="0"/>
+              </a:spcBef>
+              <a:spcAft>
+                <a:spcPct val="0"/>
+              </a:spcAft>
+              <a:defRPr sz="2200">
+                <a:solidFill>
+                  <a:schemeClr val="tx1"/>
+                </a:solidFill>
+                <a:latin typeface="Arial" charset="0"/>
+              </a:defRPr>
+            </a:lvl7pPr>
+            <a:lvl8pPr marL="3429000" indent="-228600" defTabSz="4389438" eaLnBrk="0" fontAlgn="base" hangingPunct="0">
+              <a:spcBef>
+                <a:spcPct val="0"/>
+              </a:spcBef>
+              <a:spcAft>
+                <a:spcPct val="0"/>
+              </a:spcAft>
+              <a:defRPr sz="2200">
+                <a:solidFill>
+                  <a:schemeClr val="tx1"/>
+                </a:solidFill>
+                <a:latin typeface="Arial" charset="0"/>
+              </a:defRPr>
+            </a:lvl8pPr>
+            <a:lvl9pPr marL="3886200" indent="-228600" defTabSz="4389438" eaLnBrk="0" fontAlgn="base" hangingPunct="0">
+              <a:spcBef>
+                <a:spcPct val="0"/>
+              </a:spcBef>
+              <a:spcAft>
+                <a:spcPct val="0"/>
+              </a:spcAft>
+              <a:defRPr sz="2200">
+                <a:solidFill>
+                  <a:schemeClr val="tx1"/>
+                </a:solidFill>
+                <a:latin typeface="Arial" charset="0"/>
+              </a:defRPr>
+            </a:lvl9pPr>
+          </a:lstStyle>
+          <a:p>
+            <a:pPr eaLnBrk="1" hangingPunct="1"/>
+            <a:r>
+              <a:rPr lang="en-US" sz="3200" b="1" dirty="0" smtClean="0">
+                <a:latin typeface="Calibri" pitchFamily="34" charset="0"/>
+              </a:rPr>
+              <a:t>Sign in and play!</a:t>
+            </a:r>
+            <a:endParaRPr lang="en-US" sz="3200" dirty="0">
+              <a:latin typeface="Calibri" pitchFamily="34" charset="0"/>
+            </a:endParaRPr>
+          </a:p>
+        </p:txBody>
+      </p:sp>
+      <p:sp>
+        <p:nvSpPr>
+          <p:cNvPr id="30" name="Text Box 181"/>
+          <p:cNvSpPr txBox="1">
+            <a:spLocks noChangeArrowheads="1"/>
+          </p:cNvSpPr>
+          <p:nvPr/>
+        </p:nvSpPr>
+        <p:spPr bwMode="auto">
+          <a:xfrm>
+            <a:off x="35016460" y="31013966"/>
+            <a:ext cx="964022" cy="561680"/>
+          </a:xfrm>
+          <a:prstGeom prst="rect">
+            <a:avLst/>
+          </a:prstGeom>
+          <a:noFill/>
+          <a:ln>
+            <a:noFill/>
+          </a:ln>
+          <a:effectLst/>
+          <a:extLst>
+            <a:ext uri="{909E8E84-426E-40DD-AFC4-6F175D3DCCD1}">
+              <a14:hiddenFill xmlns:a14="http://schemas.microsoft.com/office/drawing/2010/main">
+                <a:solidFill>
+                  <a:schemeClr val="accent1"/>
+                </a:solidFill>
+              </a14:hiddenFill>
+            </a:ext>
+            <a:ext uri="{91240B29-F687-4F45-9708-019B960494DF}">
+              <a14:hiddenLine xmlns:a14="http://schemas.microsoft.com/office/drawing/2010/main" w="9525">
+                <a:solidFill>
+                  <a:schemeClr val="tx1"/>
+                </a:solidFill>
+                <a:miter lim="800000"/>
+                <a:headEnd/>
+                <a:tailEnd/>
+              </a14:hiddenLine>
+            </a:ext>
+            <a:ext uri="{AF507438-7753-43E0-B8FC-AC1667EBCBE1}">
+              <a14:hiddenEffects xmlns:a14="http://schemas.microsoft.com/office/drawing/2010/main">
+                <a:effectLst>
+                  <a:outerShdw dist="35921" dir="2700000" algn="ctr" rotWithShape="0">
+                    <a:schemeClr val="bg2"/>
+                  </a:outerShdw>
+                </a:effectLst>
+              </a14:hiddenEffects>
+            </a:ext>
+          </a:extLst>
+        </p:spPr>
+        <p:txBody>
+          <a:bodyPr wrap="none" lIns="68568" tIns="34284" rIns="68568" bIns="34284">
+            <a:spAutoFit/>
+          </a:bodyPr>
+          <a:lstStyle>
+            <a:lvl1pPr defTabSz="4389438" eaLnBrk="0" hangingPunct="0">
+              <a:defRPr sz="2200">
+                <a:solidFill>
+                  <a:schemeClr val="tx1"/>
+                </a:solidFill>
+                <a:latin typeface="Arial" charset="0"/>
+              </a:defRPr>
+            </a:lvl1pPr>
+            <a:lvl2pPr marL="742950" indent="-285750" defTabSz="4389438" eaLnBrk="0" hangingPunct="0">
+              <a:defRPr sz="2200">
+                <a:solidFill>
+                  <a:schemeClr val="tx1"/>
+                </a:solidFill>
+                <a:latin typeface="Arial" charset="0"/>
+              </a:defRPr>
+            </a:lvl2pPr>
+            <a:lvl3pPr marL="1143000" indent="-228600" defTabSz="4389438" eaLnBrk="0" hangingPunct="0">
+              <a:defRPr sz="2200">
+                <a:solidFill>
+                  <a:schemeClr val="tx1"/>
+                </a:solidFill>
+                <a:latin typeface="Arial" charset="0"/>
+              </a:defRPr>
+            </a:lvl3pPr>
+            <a:lvl4pPr marL="1600200" indent="-228600" defTabSz="4389438" eaLnBrk="0" hangingPunct="0">
+              <a:defRPr sz="2200">
+                <a:solidFill>
+                  <a:schemeClr val="tx1"/>
+                </a:solidFill>
+                <a:latin typeface="Arial" charset="0"/>
+              </a:defRPr>
+            </a:lvl4pPr>
+            <a:lvl5pPr marL="2057400" indent="-228600" defTabSz="4389438" eaLnBrk="0" hangingPunct="0">
+              <a:defRPr sz="2200">
+                <a:solidFill>
+                  <a:schemeClr val="tx1"/>
+                </a:solidFill>
+                <a:latin typeface="Arial" charset="0"/>
+              </a:defRPr>
+            </a:lvl5pPr>
+            <a:lvl6pPr marL="2514600" indent="-228600" defTabSz="4389438" eaLnBrk="0" fontAlgn="base" hangingPunct="0">
+              <a:spcBef>
+                <a:spcPct val="0"/>
+              </a:spcBef>
+              <a:spcAft>
+                <a:spcPct val="0"/>
+              </a:spcAft>
+              <a:defRPr sz="2200">
+                <a:solidFill>
+                  <a:schemeClr val="tx1"/>
+                </a:solidFill>
+                <a:latin typeface="Arial" charset="0"/>
+              </a:defRPr>
+            </a:lvl6pPr>
+            <a:lvl7pPr marL="2971800" indent="-228600" defTabSz="4389438" eaLnBrk="0" fontAlgn="base" hangingPunct="0">
+              <a:spcBef>
+                <a:spcPct val="0"/>
+              </a:spcBef>
+              <a:spcAft>
+                <a:spcPct val="0"/>
+              </a:spcAft>
+              <a:defRPr sz="2200">
+                <a:solidFill>
+                  <a:schemeClr val="tx1"/>
+                </a:solidFill>
+                <a:latin typeface="Arial" charset="0"/>
+              </a:defRPr>
+            </a:lvl7pPr>
+            <a:lvl8pPr marL="3429000" indent="-228600" defTabSz="4389438" eaLnBrk="0" fontAlgn="base" hangingPunct="0">
+              <a:spcBef>
+                <a:spcPct val="0"/>
+              </a:spcBef>
+              <a:spcAft>
+                <a:spcPct val="0"/>
+              </a:spcAft>
+              <a:defRPr sz="2200">
+                <a:solidFill>
+                  <a:schemeClr val="tx1"/>
+                </a:solidFill>
+                <a:latin typeface="Arial" charset="0"/>
+              </a:defRPr>
+            </a:lvl8pPr>
+            <a:lvl9pPr marL="3886200" indent="-228600" defTabSz="4389438" eaLnBrk="0" fontAlgn="base" hangingPunct="0">
+              <a:spcBef>
+                <a:spcPct val="0"/>
+              </a:spcBef>
+              <a:spcAft>
+                <a:spcPct val="0"/>
+              </a:spcAft>
+              <a:defRPr sz="2200">
+                <a:solidFill>
+                  <a:schemeClr val="tx1"/>
+                </a:solidFill>
+                <a:latin typeface="Arial" charset="0"/>
+              </a:defRPr>
+            </a:lvl9pPr>
+          </a:lstStyle>
+          <a:p>
+            <a:pPr eaLnBrk="1" hangingPunct="1"/>
+            <a:r>
+              <a:rPr lang="en-US" sz="3200" b="1" dirty="0" smtClean="0">
+                <a:latin typeface="Calibri" pitchFamily="34" charset="0"/>
+              </a:rPr>
+              <a:t>Win!</a:t>
+            </a:r>
+            <a:endParaRPr lang="en-US" sz="3200" dirty="0">
+              <a:latin typeface="Calibri" pitchFamily="34" charset="0"/>
+            </a:endParaRPr>
+          </a:p>
+        </p:txBody>
+      </p:sp>
     </p:spTree>
     <p:extLst>
       <p:ext uri="{BB962C8B-B14F-4D97-AF65-F5344CB8AC3E}">
@@ -5497,7 +5381,7 @@
   <a:extraClrSchemeLst/>
   <a:extLst>
     <a:ext uri="{05A4C25C-085E-4340-85A3-A5531E510DB2}">
-      <thm15:themeFamily xmlns="" xmlns:thm15="http://schemas.microsoft.com/office/thememl/2012/main" name="Office Theme" id="{62F939B6-93AF-4DB8-9C6B-D6C7DFDC589F}" vid="{4A3C46E8-61CC-4603-A589-7422A47A8E4A}"/>
+      <thm15:themeFamily xmlns:thm15="http://schemas.microsoft.com/office/thememl/2012/main" xmlns="" name="Office Theme" id="{62F939B6-93AF-4DB8-9C6B-D6C7DFDC589F}" vid="{4A3C46E8-61CC-4603-A589-7422A47A8E4A}"/>
     </a:ext>
   </a:extLst>
 </a:theme>

</xml_diff>

<commit_message>
updated poster for colin
</commit_message>
<xml_diff>
--- a/Important Docs and Links/NFL-Picks Poster.pptx
+++ b/Important Docs and Links/NFL-Picks Poster.pptx
@@ -208,7 +208,7 @@
           <a:p>
             <a:fld id="{CC7D2A02-BA2D-F748-A7F0-8EF1DA740F06}" type="datetimeFigureOut">
               <a:rPr lang="en-US" smtClean="0"/>
-              <a:t>4/5/2017</a:t>
+              <a:t>4/10/2017</a:t>
             </a:fld>
             <a:endParaRPr lang="en-US"/>
           </a:p>
@@ -955,7 +955,7 @@
           <a:p>
             <a:fld id="{985D6BDF-9D0E-4E2B-85B8-D8F4790360C9}" type="datetimeFigureOut">
               <a:rPr lang="en-US" smtClean="0"/>
-              <a:t>4/5/2017</a:t>
+              <a:t>4/10/2017</a:t>
             </a:fld>
             <a:endParaRPr lang="en-US" dirty="0"/>
           </a:p>
@@ -1175,7 +1175,7 @@
           <a:p>
             <a:fld id="{985D6BDF-9D0E-4E2B-85B8-D8F4790360C9}" type="datetimeFigureOut">
               <a:rPr lang="en-US" smtClean="0"/>
-              <a:t>4/5/2017</a:t>
+              <a:t>4/10/2017</a:t>
             </a:fld>
             <a:endParaRPr lang="en-US" dirty="0"/>
           </a:p>
@@ -2028,8 +2028,8 @@
         </p:nvSpPr>
         <p:spPr bwMode="auto">
           <a:xfrm>
-            <a:off x="1463040" y="5638800"/>
-            <a:ext cx="13167360" cy="8156079"/>
+            <a:off x="15029866" y="5693465"/>
+            <a:ext cx="13125796" cy="8156079"/>
           </a:xfrm>
           <a:prstGeom prst="rect">
             <a:avLst/>
@@ -2047,7 +2047,7 @@
           <a:effectLst/>
         </p:spPr>
         <p:txBody>
-          <a:bodyPr lIns="365760" tIns="457200" rIns="365760" bIns="365760">
+          <a:bodyPr wrap="square" lIns="365760" tIns="457200" rIns="365760" bIns="365760">
             <a:spAutoFit/>
           </a:bodyPr>
           <a:lstStyle>
@@ -2420,8 +2420,8 @@
         </p:nvSpPr>
         <p:spPr>
           <a:xfrm>
-            <a:off x="1463040" y="5007665"/>
-            <a:ext cx="13167360" cy="685800"/>
+            <a:off x="15029866" y="5007665"/>
+            <a:ext cx="13133172" cy="685800"/>
           </a:xfrm>
           <a:prstGeom prst="rect">
             <a:avLst/>
@@ -2490,8 +2490,8 @@
         </p:nvSpPr>
         <p:spPr bwMode="auto">
           <a:xfrm>
-            <a:off x="28885055" y="14935203"/>
-            <a:ext cx="13167360" cy="7232749"/>
+            <a:off x="15029866" y="24154181"/>
+            <a:ext cx="13173087" cy="7232749"/>
           </a:xfrm>
           <a:prstGeom prst="rect">
             <a:avLst/>
@@ -2509,7 +2509,7 @@
           <a:effectLst/>
         </p:spPr>
         <p:txBody>
-          <a:bodyPr lIns="365760" tIns="457200" rIns="365760" bIns="365760">
+          <a:bodyPr wrap="square" lIns="365760" tIns="457200" rIns="365760" bIns="365760">
             <a:spAutoFit/>
           </a:bodyPr>
           <a:lstStyle>
@@ -2755,7 +2755,7 @@
           </a:fontRef>
         </p:style>
         <p:txBody>
-          <a:bodyPr lIns="68568" tIns="34284" rIns="68568" bIns="34284" rtlCol="0" anchor="ctr"/>
+          <a:bodyPr lIns="68568" tIns="34284" rIns="68568" bIns="91440" rtlCol="0" anchor="ctr"/>
           <a:lstStyle/>
           <a:p>
             <a:pPr algn="ctr"/>
@@ -2795,8 +2795,8 @@
         </p:nvSpPr>
         <p:spPr bwMode="auto">
           <a:xfrm>
-            <a:off x="15361920" y="5638800"/>
-            <a:ext cx="13167360" cy="8217634"/>
+            <a:off x="15029866" y="14933770"/>
+            <a:ext cx="13167360" cy="7725192"/>
           </a:xfrm>
           <a:prstGeom prst="rect">
             <a:avLst/>
@@ -3062,12 +3062,6 @@
               <a:latin typeface="Calibri" pitchFamily="34" charset="0"/>
             </a:endParaRPr>
           </a:p>
-          <a:p>
-            <a:pPr eaLnBrk="1" hangingPunct="1"/>
-            <a:endParaRPr lang="en-US" sz="3200" b="1" dirty="0">
-              <a:latin typeface="Calibri" pitchFamily="34" charset="0"/>
-            </a:endParaRPr>
-          </a:p>
         </p:txBody>
       </p:sp>
       <p:sp>
@@ -3078,7 +3072,7 @@
         </p:nvSpPr>
         <p:spPr>
           <a:xfrm>
-            <a:off x="15361920" y="5007665"/>
+            <a:off x="15029866" y="14247970"/>
             <a:ext cx="13167360" cy="685800"/>
           </a:xfrm>
           <a:prstGeom prst="rect">
@@ -3148,7 +3142,7 @@
         </p:nvSpPr>
         <p:spPr bwMode="auto">
           <a:xfrm>
-            <a:off x="28803600" y="5715000"/>
+            <a:off x="28793499" y="12519046"/>
             <a:ext cx="13167360" cy="8217634"/>
           </a:xfrm>
           <a:prstGeom prst="rect">
@@ -3388,7 +3382,13 @@
               <a:rPr lang="en-US" sz="3200" dirty="0" smtClean="0">
                 <a:latin typeface="Calibri" pitchFamily="34" charset="0"/>
               </a:rPr>
-              <a:t>combined with Ajax calls allowed us to retrieve data from our database and dynamically display that data on our web pages asynchronously</a:t>
+              <a:t>combined with Ajax calls allowed us to retrieve data from our database and dynamically display that data on our web pages </a:t>
+            </a:r>
+            <a:r>
+              <a:rPr lang="en-US" sz="3200" dirty="0" smtClean="0">
+                <a:latin typeface="Calibri" pitchFamily="34" charset="0"/>
+              </a:rPr>
+              <a:t>asynchronously</a:t>
             </a:r>
           </a:p>
         </p:txBody>
@@ -3401,7 +3401,7 @@
         </p:nvSpPr>
         <p:spPr>
           <a:xfrm>
-            <a:off x="28803600" y="5029200"/>
+            <a:off x="28793499" y="11818635"/>
             <a:ext cx="13167360" cy="685800"/>
           </a:xfrm>
           <a:prstGeom prst="rect">
@@ -3715,7 +3715,7 @@
         </p:nvSpPr>
         <p:spPr>
           <a:xfrm>
-            <a:off x="28885055" y="14247970"/>
+            <a:off x="15029866" y="23475570"/>
             <a:ext cx="13167360" cy="685800"/>
           </a:xfrm>
           <a:prstGeom prst="rect">
@@ -3951,7 +3951,7 @@
         </p:nvSpPr>
         <p:spPr bwMode="auto">
           <a:xfrm>
-            <a:off x="20723077" y="31067411"/>
+            <a:off x="33987875" y="31067410"/>
             <a:ext cx="2902245" cy="561680"/>
           </a:xfrm>
           <a:prstGeom prst="rect">
@@ -4389,90 +4389,8 @@
         </p:blipFill>
         <p:spPr bwMode="auto">
           <a:xfrm>
-            <a:off x="15316518" y="23432066"/>
-            <a:ext cx="13258164" cy="6775286"/>
-          </a:xfrm>
-          <a:prstGeom prst="rect">
-            <a:avLst/>
-          </a:prstGeom>
-          <a:noFill/>
-          <a:extLst>
-            <a:ext uri="{909E8E84-426E-40DD-AFC4-6F175D3DCCD1}">
-              <a14:hiddenFill xmlns:a14="http://schemas.microsoft.com/office/drawing/2010/main">
-                <a:solidFill>
-                  <a:srgbClr val="FFFFFF"/>
-                </a:solidFill>
-              </a14:hiddenFill>
-            </a:ext>
-          </a:extLst>
-        </p:spPr>
-      </p:pic>
-      <p:pic>
-        <p:nvPicPr>
-          <p:cNvPr id="1029" name="Picture 5" descr="C:\Users\Lou\Desktop\win_ss.PNG"/>
-          <p:cNvPicPr>
-            <a:picLocks noChangeAspect="1" noChangeArrowheads="1"/>
-          </p:cNvPicPr>
-          <p:nvPr/>
-        </p:nvPicPr>
-        <p:blipFill>
-          <a:blip r:embed="rId10">
-            <a:extLst>
-              <a:ext uri="{28A0092B-C50C-407E-A947-70E740481C1C}">
-                <a14:useLocalDpi xmlns:a14="http://schemas.microsoft.com/office/drawing/2010/main" val="0"/>
-              </a:ext>
-            </a:extLst>
-          </a:blip>
-          <a:srcRect/>
-          <a:stretch>
-            <a:fillRect/>
-          </a:stretch>
-        </p:blipFill>
-        <p:spPr bwMode="auto">
-          <a:xfrm>
-            <a:off x="28944528" y="23432065"/>
-            <a:ext cx="13107887" cy="6622202"/>
-          </a:xfrm>
-          <a:prstGeom prst="rect">
-            <a:avLst/>
-          </a:prstGeom>
-          <a:noFill/>
-          <a:extLst>
-            <a:ext uri="{909E8E84-426E-40DD-AFC4-6F175D3DCCD1}">
-              <a14:hiddenFill xmlns:a14="http://schemas.microsoft.com/office/drawing/2010/main">
-                <a:solidFill>
-                  <a:srgbClr val="FFFFFF"/>
-                </a:solidFill>
-              </a14:hiddenFill>
-            </a:ext>
-          </a:extLst>
-        </p:spPr>
-      </p:pic>
-      <p:pic>
-        <p:nvPicPr>
-          <p:cNvPr id="3" name="Picture 2" descr="C:\Users\Lou\Desktop\home_page_updated_Ss.PNG"/>
-          <p:cNvPicPr>
-            <a:picLocks noChangeAspect="1" noChangeArrowheads="1"/>
-          </p:cNvPicPr>
-          <p:nvPr/>
-        </p:nvPicPr>
-        <p:blipFill>
-          <a:blip r:embed="rId11">
-            <a:extLst>
-              <a:ext uri="{28A0092B-C50C-407E-A947-70E740481C1C}">
-                <a14:useLocalDpi xmlns:a14="http://schemas.microsoft.com/office/drawing/2010/main" val="0"/>
-              </a:ext>
-            </a:extLst>
-          </a:blip>
-          <a:srcRect/>
-          <a:stretch>
-            <a:fillRect/>
-          </a:stretch>
-        </p:blipFill>
-        <p:spPr bwMode="auto">
-          <a:xfrm>
-            <a:off x="15361920" y="14315580"/>
-            <a:ext cx="13167360" cy="6659899"/>
+            <a:off x="28897992" y="23497073"/>
+            <a:ext cx="13094950" cy="6775286"/>
           </a:xfrm>
           <a:prstGeom prst="rect">
             <a:avLst/>
@@ -4499,7 +4417,7 @@
         </p:nvSpPr>
         <p:spPr bwMode="auto">
           <a:xfrm>
-            <a:off x="20480660" y="22138056"/>
+            <a:off x="6466913" y="12886386"/>
             <a:ext cx="2929880" cy="561680"/>
           </a:xfrm>
           <a:prstGeom prst="rect">
@@ -4665,7 +4583,7 @@
         </p:nvSpPr>
         <p:spPr bwMode="auto">
           <a:xfrm>
-            <a:off x="35016460" y="31013966"/>
+            <a:off x="34911210" y="10896600"/>
             <a:ext cx="964022" cy="561680"/>
           </a:xfrm>
           <a:prstGeom prst="rect">
@@ -4821,6 +4739,88 @@
           </a:p>
         </p:txBody>
       </p:sp>
+      <p:pic>
+        <p:nvPicPr>
+          <p:cNvPr id="6" name="Picture 2" descr="C:\Users\Lou\Desktop\home_page_updated_4_9.PNG"/>
+          <p:cNvPicPr>
+            <a:picLocks noChangeAspect="1" noChangeArrowheads="1"/>
+          </p:cNvPicPr>
+          <p:nvPr/>
+        </p:nvPicPr>
+        <p:blipFill>
+          <a:blip r:embed="rId10">
+            <a:extLst>
+              <a:ext uri="{28A0092B-C50C-407E-A947-70E740481C1C}">
+                <a14:useLocalDpi xmlns:a14="http://schemas.microsoft.com/office/drawing/2010/main" val="0"/>
+              </a:ext>
+            </a:extLst>
+          </a:blip>
+          <a:srcRect/>
+          <a:stretch>
+            <a:fillRect/>
+          </a:stretch>
+        </p:blipFill>
+        <p:spPr bwMode="auto">
+          <a:xfrm>
+            <a:off x="1274698" y="5693465"/>
+            <a:ext cx="13314310" cy="6810970"/>
+          </a:xfrm>
+          <a:prstGeom prst="rect">
+            <a:avLst/>
+          </a:prstGeom>
+          <a:noFill/>
+          <a:extLst>
+            <a:ext uri="{909E8E84-426E-40DD-AFC4-6F175D3DCCD1}">
+              <a14:hiddenFill xmlns:a14="http://schemas.microsoft.com/office/drawing/2010/main">
+                <a:solidFill>
+                  <a:srgbClr val="FFFFFF"/>
+                </a:solidFill>
+              </a14:hiddenFill>
+            </a:ext>
+          </a:extLst>
+        </p:spPr>
+      </p:pic>
+      <p:pic>
+        <p:nvPicPr>
+          <p:cNvPr id="9" name="Picture 3" descr="C:\Users\Lou\Desktop\win_ss_updated.PNG"/>
+          <p:cNvPicPr>
+            <a:picLocks noChangeAspect="1" noChangeArrowheads="1"/>
+          </p:cNvPicPr>
+          <p:nvPr/>
+        </p:nvPicPr>
+        <p:blipFill>
+          <a:blip r:embed="rId11">
+            <a:extLst>
+              <a:ext uri="{28A0092B-C50C-407E-A947-70E740481C1C}">
+                <a14:useLocalDpi xmlns:a14="http://schemas.microsoft.com/office/drawing/2010/main" val="0"/>
+              </a:ext>
+            </a:extLst>
+          </a:blip>
+          <a:srcRect/>
+          <a:stretch>
+            <a:fillRect/>
+          </a:stretch>
+        </p:blipFill>
+        <p:spPr bwMode="auto">
+          <a:xfrm>
+            <a:off x="28793499" y="5693466"/>
+            <a:ext cx="13199444" cy="4783822"/>
+          </a:xfrm>
+          <a:prstGeom prst="rect">
+            <a:avLst/>
+          </a:prstGeom>
+          <a:noFill/>
+          <a:extLst>
+            <a:ext uri="{909E8E84-426E-40DD-AFC4-6F175D3DCCD1}">
+              <a14:hiddenFill xmlns:a14="http://schemas.microsoft.com/office/drawing/2010/main">
+                <a:solidFill>
+                  <a:srgbClr val="FFFFFF"/>
+                </a:solidFill>
+              </a14:hiddenFill>
+            </a:ext>
+          </a:extLst>
+        </p:spPr>
+      </p:pic>
     </p:spTree>
     <p:extLst>
       <p:ext uri="{BB962C8B-B14F-4D97-AF65-F5344CB8AC3E}">

</xml_diff>

<commit_message>
Some SQL injection protection and poster touch up
</commit_message>
<xml_diff>
--- a/Important Docs and Links/NFL-Picks Poster.pptx
+++ b/Important Docs and Links/NFL-Picks Poster.pptx
@@ -109,7 +109,7 @@
   </p:defaultTextStyle>
   <p:extLst>
     <p:ext uri="{EFAFB233-063F-42B5-8137-9DF3F51BA10A}">
-      <p15:sldGuideLst xmlns:p15="http://schemas.microsoft.com/office/powerpoint/2012/main" xmlns="">
+      <p15:sldGuideLst xmlns="" xmlns:p15="http://schemas.microsoft.com/office/powerpoint/2012/main">
         <p15:guide id="1" orient="horz" pos="10368">
           <p15:clr>
             <a:srgbClr val="A4A3A4"/>
@@ -208,7 +208,7 @@
           <a:p>
             <a:fld id="{CC7D2A02-BA2D-F748-A7F0-8EF1DA740F06}" type="datetimeFigureOut">
               <a:rPr lang="en-US" smtClean="0"/>
-              <a:t>4/10/2017</a:t>
+              <a:t>4/10/17</a:t>
             </a:fld>
             <a:endParaRPr lang="en-US"/>
           </a:p>
@@ -839,7 +839,7 @@
   <p:timing>
     <p:tnLst>
       <p:par>
-        <p:cTn id="1" dur="indefinite" restart="never" nodeType="tmRoot"/>
+        <p:cTn xmlns:p14="http://schemas.microsoft.com/office/powerpoint/2010/main" id="1" dur="indefinite" restart="never" nodeType="tmRoot"/>
       </p:par>
     </p:tnLst>
   </p:timing>
@@ -955,7 +955,7 @@
           <a:p>
             <a:fld id="{985D6BDF-9D0E-4E2B-85B8-D8F4790360C9}" type="datetimeFigureOut">
               <a:rPr lang="en-US" smtClean="0"/>
-              <a:t>4/10/2017</a:t>
+              <a:t>4/10/17</a:t>
             </a:fld>
             <a:endParaRPr lang="en-US" dirty="0"/>
           </a:p>
@@ -1016,7 +1016,7 @@
   <p:timing>
     <p:tnLst>
       <p:par>
-        <p:cTn id="1" dur="indefinite" restart="never" nodeType="tmRoot"/>
+        <p:cTn xmlns:p14="http://schemas.microsoft.com/office/powerpoint/2010/main" id="1" dur="indefinite" restart="never" nodeType="tmRoot"/>
       </p:par>
     </p:tnLst>
   </p:timing>
@@ -1175,7 +1175,7 @@
           <a:p>
             <a:fld id="{985D6BDF-9D0E-4E2B-85B8-D8F4790360C9}" type="datetimeFigureOut">
               <a:rPr lang="en-US" smtClean="0"/>
-              <a:t>4/10/2017</a:t>
+              <a:t>4/10/17</a:t>
             </a:fld>
             <a:endParaRPr lang="en-US" dirty="0"/>
           </a:p>
@@ -1274,7 +1274,7 @@
   <p:timing>
     <p:tnLst>
       <p:par>
-        <p:cTn id="1" dur="indefinite" restart="never" nodeType="tmRoot"/>
+        <p:cTn xmlns:p14="http://schemas.microsoft.com/office/powerpoint/2010/main" id="1" dur="indefinite" restart="never" nodeType="tmRoot"/>
       </p:par>
     </p:tnLst>
   </p:timing>
@@ -1570,14 +1570,14 @@
           </a:ln>
           <a:effectLst/>
           <a:extLst>
-            <a:ext uri="{909E8E84-426E-40DD-AFC4-6F175D3DCCD1}">
+            <a:ext uri="{909E8E84-426E-40dd-AFC4-6F175D3DCCD1}">
               <a14:hiddenFill xmlns:a14="http://schemas.microsoft.com/office/drawing/2010/main">
                 <a:solidFill>
                   <a:schemeClr val="accent1"/>
                 </a:solidFill>
               </a14:hiddenFill>
             </a:ext>
-            <a:ext uri="{91240B29-F687-4F45-9708-019B960494DF}">
+            <a:ext uri="{91240B29-F687-4f45-9708-019B960494DF}">
               <a14:hiddenLine xmlns:a14="http://schemas.microsoft.com/office/drawing/2010/main" w="9525">
                 <a:solidFill>
                   <a:schemeClr val="tx1"/>
@@ -1587,7 +1587,7 @@
                 <a:tailEnd/>
               </a14:hiddenLine>
             </a:ext>
-            <a:ext uri="{AF507438-7753-43E0-B8FC-AC1667EBCBE1}">
+            <a:ext uri="{AF507438-7753-43e0-B8FC-AC1667EBCBE1}">
               <a14:hiddenEffects xmlns:a14="http://schemas.microsoft.com/office/drawing/2010/main">
                 <a:effectLst>
                   <a:outerShdw dist="35921" dir="2700000" algn="ctr" rotWithShape="0">
@@ -1756,14 +1756,14 @@
           </a:ln>
           <a:effectLst/>
           <a:extLst>
-            <a:ext uri="{909E8E84-426E-40DD-AFC4-6F175D3DCCD1}">
+            <a:ext uri="{909E8E84-426E-40dd-AFC4-6F175D3DCCD1}">
               <a14:hiddenFill xmlns:a14="http://schemas.microsoft.com/office/drawing/2010/main">
                 <a:solidFill>
                   <a:schemeClr val="accent1"/>
                 </a:solidFill>
               </a14:hiddenFill>
             </a:ext>
-            <a:ext uri="{91240B29-F687-4F45-9708-019B960494DF}">
+            <a:ext uri="{91240B29-F687-4f45-9708-019B960494DF}">
               <a14:hiddenLine xmlns:a14="http://schemas.microsoft.com/office/drawing/2010/main" w="9525">
                 <a:solidFill>
                   <a:schemeClr val="tx1"/>
@@ -1773,7 +1773,7 @@
                 <a:tailEnd/>
               </a14:hiddenLine>
             </a:ext>
-            <a:ext uri="{AF507438-7753-43E0-B8FC-AC1667EBCBE1}">
+            <a:ext uri="{AF507438-7753-43e0-B8FC-AC1667EBCBE1}">
               <a14:hiddenEffects xmlns:a14="http://schemas.microsoft.com/office/drawing/2010/main">
                 <a:effectLst>
                   <a:outerShdw dist="35921" dir="2700000" algn="ctr" rotWithShape="0">
@@ -3142,7 +3142,7 @@
         </p:nvSpPr>
         <p:spPr bwMode="auto">
           <a:xfrm>
-            <a:off x="28793499" y="12519046"/>
+            <a:off x="28803600" y="14935200"/>
             <a:ext cx="13167360" cy="8217634"/>
           </a:xfrm>
           <a:prstGeom prst="rect">
@@ -3382,13 +3382,7 @@
               <a:rPr lang="en-US" sz="3200" dirty="0" smtClean="0">
                 <a:latin typeface="Calibri" pitchFamily="34" charset="0"/>
               </a:rPr>
-              <a:t>combined with Ajax calls allowed us to retrieve data from our database and dynamically display that data on our web pages </a:t>
-            </a:r>
-            <a:r>
-              <a:rPr lang="en-US" sz="3200" dirty="0" smtClean="0">
-                <a:latin typeface="Calibri" pitchFamily="34" charset="0"/>
-              </a:rPr>
-              <a:t>asynchronously</a:t>
+              <a:t>combined with Ajax calls allowed us to retrieve data from our database and dynamically display that data on our web pages asynchronously</a:t>
             </a:r>
           </a:p>
         </p:txBody>
@@ -3401,7 +3395,7 @@
         </p:nvSpPr>
         <p:spPr>
           <a:xfrm>
-            <a:off x="28793499" y="11818635"/>
+            <a:off x="28803600" y="14249400"/>
             <a:ext cx="13167360" cy="685800"/>
           </a:xfrm>
           <a:prstGeom prst="rect">
@@ -3797,14 +3791,14 @@
           </a:ln>
           <a:effectLst/>
           <a:extLst>
-            <a:ext uri="{909E8E84-426E-40DD-AFC4-6F175D3DCCD1}">
+            <a:ext uri="{909E8E84-426E-40dd-AFC4-6F175D3DCCD1}">
               <a14:hiddenFill xmlns:a14="http://schemas.microsoft.com/office/drawing/2010/main">
                 <a:solidFill>
                   <a:schemeClr val="accent1"/>
                 </a:solidFill>
               </a14:hiddenFill>
             </a:ext>
-            <a:ext uri="{91240B29-F687-4F45-9708-019B960494DF}">
+            <a:ext uri="{91240B29-F687-4f45-9708-019B960494DF}">
               <a14:hiddenLine xmlns:a14="http://schemas.microsoft.com/office/drawing/2010/main" w="9525">
                 <a:solidFill>
                   <a:schemeClr val="tx1"/>
@@ -3814,7 +3808,7 @@
                 <a:tailEnd/>
               </a14:hiddenLine>
             </a:ext>
-            <a:ext uri="{AF507438-7753-43E0-B8FC-AC1667EBCBE1}">
+            <a:ext uri="{AF507438-7753-43e0-B8FC-AC1667EBCBE1}">
               <a14:hiddenEffects xmlns:a14="http://schemas.microsoft.com/office/drawing/2010/main">
                 <a:effectLst>
                   <a:outerShdw dist="35921" dir="2700000" algn="ctr" rotWithShape="0">
@@ -3951,7 +3945,7 @@
         </p:nvSpPr>
         <p:spPr bwMode="auto">
           <a:xfrm>
-            <a:off x="33987875" y="31067410"/>
+            <a:off x="34290000" y="13182600"/>
             <a:ext cx="2902245" cy="561680"/>
           </a:xfrm>
           <a:prstGeom prst="rect">
@@ -3963,14 +3957,14 @@
           </a:ln>
           <a:effectLst/>
           <a:extLst>
-            <a:ext uri="{909E8E84-426E-40DD-AFC4-6F175D3DCCD1}">
+            <a:ext uri="{909E8E84-426E-40dd-AFC4-6F175D3DCCD1}">
               <a14:hiddenFill xmlns:a14="http://schemas.microsoft.com/office/drawing/2010/main">
                 <a:solidFill>
                   <a:schemeClr val="accent1"/>
                 </a:solidFill>
               </a14:hiddenFill>
             </a:ext>
-            <a:ext uri="{91240B29-F687-4F45-9708-019B960494DF}">
+            <a:ext uri="{91240B29-F687-4f45-9708-019B960494DF}">
               <a14:hiddenLine xmlns:a14="http://schemas.microsoft.com/office/drawing/2010/main" w="9525">
                 <a:solidFill>
                   <a:schemeClr val="tx1"/>
@@ -3980,7 +3974,7 @@
                 <a:tailEnd/>
               </a14:hiddenLine>
             </a:ext>
-            <a:ext uri="{AF507438-7753-43E0-B8FC-AC1667EBCBE1}">
+            <a:ext uri="{AF507438-7753-43e0-B8FC-AC1667EBCBE1}">
               <a14:hiddenEffects xmlns:a14="http://schemas.microsoft.com/office/drawing/2010/main">
                 <a:effectLst>
                   <a:outerShdw dist="35921" dir="2700000" algn="ctr" rotWithShape="0">
@@ -4187,14 +4181,14 @@
             <a:noFill/>
           </a:ln>
           <a:extLst>
-            <a:ext uri="{909E8E84-426E-40DD-AFC4-6F175D3DCCD1}">
+            <a:ext uri="{909E8E84-426E-40dd-AFC4-6F175D3DCCD1}">
               <a14:hiddenFill xmlns:a14="http://schemas.microsoft.com/office/drawing/2010/main">
                 <a:solidFill>
                   <a:srgbClr val="FFFFFF"/>
                 </a:solidFill>
               </a14:hiddenFill>
             </a:ext>
-            <a:ext uri="{91240B29-F687-4F45-9708-019B960494DF}">
+            <a:ext uri="{91240B29-F687-4f45-9708-019B960494DF}">
               <a14:hiddenLine xmlns:a14="http://schemas.microsoft.com/office/drawing/2010/main" w="9525">
                 <a:solidFill>
                   <a:srgbClr val="000000"/>
@@ -4239,14 +4233,14 @@
             <a:noFill/>
           </a:ln>
           <a:extLst>
-            <a:ext uri="{909E8E84-426E-40DD-AFC4-6F175D3DCCD1}">
+            <a:ext uri="{909E8E84-426E-40dd-AFC4-6F175D3DCCD1}">
               <a14:hiddenFill xmlns:a14="http://schemas.microsoft.com/office/drawing/2010/main">
                 <a:solidFill>
                   <a:srgbClr val="FFFFFF"/>
                 </a:solidFill>
               </a14:hiddenFill>
             </a:ext>
-            <a:ext uri="{91240B29-F687-4F45-9708-019B960494DF}">
+            <a:ext uri="{91240B29-F687-4f45-9708-019B960494DF}">
               <a14:hiddenLine xmlns:a14="http://schemas.microsoft.com/office/drawing/2010/main" w="9525">
                 <a:solidFill>
                   <a:srgbClr val="000000"/>
@@ -4356,7 +4350,7 @@
           </a:prstGeom>
           <a:noFill/>
           <a:extLst>
-            <a:ext uri="{909E8E84-426E-40DD-AFC4-6F175D3DCCD1}">
+            <a:ext uri="{909E8E84-426E-40dd-AFC4-6F175D3DCCD1}">
               <a14:hiddenFill xmlns:a14="http://schemas.microsoft.com/office/drawing/2010/main">
                 <a:solidFill>
                   <a:srgbClr val="FFFFFF"/>
@@ -4389,15 +4383,15 @@
         </p:blipFill>
         <p:spPr bwMode="auto">
           <a:xfrm>
-            <a:off x="28897992" y="23497073"/>
-            <a:ext cx="13094950" cy="6775286"/>
+            <a:off x="28575000" y="4876800"/>
+            <a:ext cx="13991194" cy="8001000"/>
           </a:xfrm>
           <a:prstGeom prst="rect">
             <a:avLst/>
           </a:prstGeom>
           <a:noFill/>
           <a:extLst>
-            <a:ext uri="{909E8E84-426E-40DD-AFC4-6F175D3DCCD1}">
+            <a:ext uri="{909E8E84-426E-40dd-AFC4-6F175D3DCCD1}">
               <a14:hiddenFill xmlns:a14="http://schemas.microsoft.com/office/drawing/2010/main">
                 <a:solidFill>
                   <a:srgbClr val="FFFFFF"/>
@@ -4429,14 +4423,14 @@
           </a:ln>
           <a:effectLst/>
           <a:extLst>
-            <a:ext uri="{909E8E84-426E-40DD-AFC4-6F175D3DCCD1}">
+            <a:ext uri="{909E8E84-426E-40dd-AFC4-6F175D3DCCD1}">
               <a14:hiddenFill xmlns:a14="http://schemas.microsoft.com/office/drawing/2010/main">
                 <a:solidFill>
                   <a:schemeClr val="accent1"/>
                 </a:solidFill>
               </a14:hiddenFill>
             </a:ext>
-            <a:ext uri="{91240B29-F687-4F45-9708-019B960494DF}">
+            <a:ext uri="{91240B29-F687-4f45-9708-019B960494DF}">
               <a14:hiddenLine xmlns:a14="http://schemas.microsoft.com/office/drawing/2010/main" w="9525">
                 <a:solidFill>
                   <a:schemeClr val="tx1"/>
@@ -4446,7 +4440,7 @@
                 <a:tailEnd/>
               </a14:hiddenLine>
             </a:ext>
-            <a:ext uri="{AF507438-7753-43E0-B8FC-AC1667EBCBE1}">
+            <a:ext uri="{AF507438-7753-43e0-B8FC-AC1667EBCBE1}">
               <a14:hiddenEffects xmlns:a14="http://schemas.microsoft.com/office/drawing/2010/main">
                 <a:effectLst>
                   <a:outerShdw dist="35921" dir="2700000" algn="ctr" rotWithShape="0">
@@ -4583,7 +4577,7 @@
         </p:nvSpPr>
         <p:spPr bwMode="auto">
           <a:xfrm>
-            <a:off x="34911210" y="10896600"/>
+            <a:off x="34671000" y="29946600"/>
             <a:ext cx="964022" cy="561680"/>
           </a:xfrm>
           <a:prstGeom prst="rect">
@@ -4595,14 +4589,14 @@
           </a:ln>
           <a:effectLst/>
           <a:extLst>
-            <a:ext uri="{909E8E84-426E-40DD-AFC4-6F175D3DCCD1}">
+            <a:ext uri="{909E8E84-426E-40dd-AFC4-6F175D3DCCD1}">
               <a14:hiddenFill xmlns:a14="http://schemas.microsoft.com/office/drawing/2010/main">
                 <a:solidFill>
                   <a:schemeClr val="accent1"/>
                 </a:solidFill>
               </a14:hiddenFill>
             </a:ext>
-            <a:ext uri="{91240B29-F687-4F45-9708-019B960494DF}">
+            <a:ext uri="{91240B29-F687-4f45-9708-019B960494DF}">
               <a14:hiddenLine xmlns:a14="http://schemas.microsoft.com/office/drawing/2010/main" w="9525">
                 <a:solidFill>
                   <a:schemeClr val="tx1"/>
@@ -4612,7 +4606,7 @@
                 <a:tailEnd/>
               </a14:hiddenLine>
             </a:ext>
-            <a:ext uri="{AF507438-7753-43E0-B8FC-AC1667EBCBE1}">
+            <a:ext uri="{AF507438-7753-43e0-B8FC-AC1667EBCBE1}">
               <a14:hiddenEffects xmlns:a14="http://schemas.microsoft.com/office/drawing/2010/main">
                 <a:effectLst>
                   <a:outerShdw dist="35921" dir="2700000" algn="ctr" rotWithShape="0">
@@ -4770,7 +4764,7 @@
           </a:prstGeom>
           <a:noFill/>
           <a:extLst>
-            <a:ext uri="{909E8E84-426E-40DD-AFC4-6F175D3DCCD1}">
+            <a:ext uri="{909E8E84-426E-40dd-AFC4-6F175D3DCCD1}">
               <a14:hiddenFill xmlns:a14="http://schemas.microsoft.com/office/drawing/2010/main">
                 <a:solidFill>
                   <a:srgbClr val="FFFFFF"/>
@@ -4782,7 +4776,7 @@
       </p:pic>
       <p:pic>
         <p:nvPicPr>
-          <p:cNvPr id="9" name="Picture 3" descr="C:\Users\Lou\Desktop\win_ss_updated.PNG"/>
+          <p:cNvPr id="28" name="Picture 3" descr="C:\Users\Lou\Desktop\win_ss_updated.PNG"/>
           <p:cNvPicPr>
             <a:picLocks noChangeAspect="1" noChangeArrowheads="1"/>
           </p:cNvPicPr>
@@ -4803,15 +4797,15 @@
         </p:blipFill>
         <p:spPr bwMode="auto">
           <a:xfrm>
-            <a:off x="28793499" y="5693466"/>
-            <a:ext cx="13199444" cy="4783822"/>
+            <a:off x="28651200" y="23469600"/>
+            <a:ext cx="13199444" cy="5791200"/>
           </a:xfrm>
           <a:prstGeom prst="rect">
             <a:avLst/>
           </a:prstGeom>
           <a:noFill/>
           <a:extLst>
-            <a:ext uri="{909E8E84-426E-40DD-AFC4-6F175D3DCCD1}">
+            <a:ext uri="{909E8E84-426E-40dd-AFC4-6F175D3DCCD1}">
               <a14:hiddenFill xmlns:a14="http://schemas.microsoft.com/office/drawing/2010/main">
                 <a:solidFill>
                   <a:srgbClr val="FFFFFF"/>
@@ -4834,7 +4828,7 @@
   <p:timing>
     <p:tnLst>
       <p:par>
-        <p:cTn id="1" dur="indefinite" restart="never" nodeType="tmRoot"/>
+        <p:cTn xmlns:p14="http://schemas.microsoft.com/office/powerpoint/2010/main" id="1" dur="indefinite" restart="never" nodeType="tmRoot"/>
       </p:par>
     </p:tnLst>
   </p:timing>
@@ -5381,7 +5375,7 @@
   <a:extraClrSchemeLst/>
   <a:extLst>
     <a:ext uri="{05A4C25C-085E-4340-85A3-A5531E510DB2}">
-      <thm15:themeFamily xmlns:thm15="http://schemas.microsoft.com/office/thememl/2012/main" xmlns="" name="Office Theme" id="{62F939B6-93AF-4DB8-9C6B-D6C7DFDC589F}" vid="{4A3C46E8-61CC-4603-A589-7422A47A8E4A}"/>
+      <thm15:themeFamily xmlns="" xmlns:thm15="http://schemas.microsoft.com/office/thememl/2012/main" name="Office Theme" id="{62F939B6-93AF-4DB8-9C6B-D6C7DFDC589F}" vid="{4A3C46E8-61CC-4603-A589-7422A47A8E4A}"/>
     </a:ext>
   </a:extLst>
 </a:theme>

</xml_diff>